<commit_message>
-Updated code and slides based on Dry Run and Full Run at Code Camp
</commit_message>
<xml_diff>
--- a/FSharpXamarin_Slides.pptx
+++ b/FSharpXamarin_Slides.pptx
@@ -118,6 +118,11 @@
       </a:defRPr>
     </a:lvl9pPr>
   </p:defaultTextStyle>
+  <p:extLst>
+    <p:ext uri="{EFAFB233-063F-42B5-8137-9DF3F51BA10A}">
+      <p15:sldGuideLst xmlns:p15="http://schemas.microsoft.com/office/powerpoint/2012/main"/>
+    </p:ext>
+  </p:extLst>
 </p:presentation>
 </file>
 
@@ -2508,6 +2513,13 @@
   <p:clrMapOvr>
     <a:masterClrMapping/>
   </p:clrMapOvr>
+  <p:timing>
+    <p:tnLst>
+      <p:par>
+        <p:cTn id="1" dur="indefinite" restart="never" nodeType="tmRoot"/>
+      </p:par>
+    </p:tnLst>
+  </p:timing>
 </p:sld>
 </file>
 
@@ -2598,8 +2610,13 @@
             <a:pPr lvl="1"/>
             <a:r>
               <a:rPr lang="en-US" dirty="0" smtClean="0"/>
-              <a:t>C# Windows 8.1 Universal</a:t>
-            </a:r>
+              <a:t>C# Windows </a:t>
+            </a:r>
+            <a:r>
+              <a:rPr lang="en-US" smtClean="0"/>
+              <a:t>8.1 Universal (UAP)</a:t>
+            </a:r>
+            <a:endParaRPr lang="en-US" dirty="0" smtClean="0"/>
           </a:p>
           <a:p>
             <a:pPr lvl="2"/>
@@ -2612,7 +2629,7 @@
             <a:pPr lvl="1"/>
             <a:r>
               <a:rPr lang="en-US" dirty="0" smtClean="0"/>
-              <a:t>C# Windows UAP (Win10)</a:t>
+              <a:t>C# Windows UWP (Win10)</a:t>
             </a:r>
           </a:p>
           <a:p>
@@ -2663,6 +2680,13 @@
   <p:clrMapOvr>
     <a:masterClrMapping/>
   </p:clrMapOvr>
+  <p:timing>
+    <p:tnLst>
+      <p:par>
+        <p:cTn id="1" dur="indefinite" restart="never" nodeType="tmRoot"/>
+      </p:par>
+    </p:tnLst>
+  </p:timing>
 </p:sld>
 </file>
 
@@ -2752,6 +2776,13 @@
   <p:clrMapOvr>
     <a:masterClrMapping/>
   </p:clrMapOvr>
+  <p:timing>
+    <p:tnLst>
+      <p:par>
+        <p:cTn id="1" dur="indefinite" restart="never" nodeType="tmRoot"/>
+      </p:par>
+    </p:tnLst>
+  </p:timing>
 </p:sld>
 </file>
 
@@ -2935,6 +2966,13 @@
   <p:clrMapOvr>
     <a:masterClrMapping/>
   </p:clrMapOvr>
+  <p:timing>
+    <p:tnLst>
+      <p:par>
+        <p:cTn id="1" dur="indefinite" restart="never" nodeType="tmRoot"/>
+      </p:par>
+    </p:tnLst>
+  </p:timing>
 </p:sld>
 </file>
 
@@ -3072,6 +3110,13 @@
   <p:clrMapOvr>
     <a:masterClrMapping/>
   </p:clrMapOvr>
+  <p:timing>
+    <p:tnLst>
+      <p:par>
+        <p:cTn id="1" dur="indefinite" restart="never" nodeType="tmRoot"/>
+      </p:par>
+    </p:tnLst>
+  </p:timing>
 </p:sld>
 </file>
 
@@ -3128,7 +3173,7 @@
         <p:spPr/>
         <p:txBody>
           <a:bodyPr>
-            <a:normAutofit fontScale="85000" lnSpcReduction="20000"/>
+            <a:normAutofit fontScale="70000" lnSpcReduction="20000"/>
           </a:bodyPr>
           <a:lstStyle/>
           <a:p>
@@ -3281,8 +3326,40 @@
               </a:rPr>
               <a:t>gist.github.com/dannydwarren/cefb9d33a67b689bddf8</a:t>
             </a:r>
-            <a:r>
-              <a:rPr lang="en-US" dirty="0" smtClean="0"/>
+            <a:endParaRPr lang="en-US" dirty="0" smtClean="0"/>
+          </a:p>
+          <a:p>
+            <a:r>
+              <a:rPr lang="en-US" dirty="0" smtClean="0"/>
+              <a:t>Pipe |&gt; vs</a:t>
+            </a:r>
+            <a:r>
+              <a:rPr lang="en-US" dirty="0" smtClean="0"/>
+              <a:t> Function Composition &gt;&gt;</a:t>
+            </a:r>
+          </a:p>
+          <a:p>
+            <a:pPr lvl="1"/>
+            <a:r>
+              <a:rPr lang="en-US">
+                <a:hlinkClick r:id="rId8"/>
+              </a:rPr>
+              <a:t>http://</a:t>
+            </a:r>
+            <a:r>
+              <a:rPr lang="en-US">
+                <a:hlinkClick r:id="rId8"/>
+              </a:rPr>
+              <a:t>fsharpforfunandprofit.com/posts/function-composition</a:t>
+            </a:r>
+            <a:r>
+              <a:rPr lang="en-US" smtClean="0">
+                <a:hlinkClick r:id="rId8"/>
+              </a:rPr>
+              <a:t>/</a:t>
+            </a:r>
+            <a:r>
+              <a:rPr lang="en-US" smtClean="0"/>
               <a:t> </a:t>
             </a:r>
             <a:endParaRPr lang="en-US" dirty="0"/>
@@ -3302,6 +3379,13 @@
   <p:clrMapOvr>
     <a:masterClrMapping/>
   </p:clrMapOvr>
+  <p:timing>
+    <p:tnLst>
+      <p:par>
+        <p:cTn id="1" dur="indefinite" restart="never" nodeType="tmRoot"/>
+      </p:par>
+    </p:tnLst>
+  </p:timing>
 </p:sld>
 </file>
 
@@ -3428,7 +3512,6 @@
               <a:rPr lang="en-US" dirty="0" smtClean="0"/>
               <a:t> </a:t>
             </a:r>
-            <a:endParaRPr lang="en-US" dirty="0" smtClean="0"/>
           </a:p>
         </p:txBody>
       </p:sp>
@@ -3660,7 +3743,6 @@
               <a:rPr lang="en-US" dirty="0" smtClean="0"/>
               <a:t>Reach Out!</a:t>
             </a:r>
-            <a:endParaRPr lang="en-US" dirty="0" smtClean="0"/>
           </a:p>
           <a:p>
             <a:pPr marL="0" indent="0" algn="ctr">
@@ -3676,7 +3758,6 @@
               <a:rPr lang="en-US" dirty="0" smtClean="0"/>
               <a:t> </a:t>
             </a:r>
-            <a:endParaRPr lang="en-US" dirty="0" smtClean="0"/>
           </a:p>
           <a:p>
             <a:pPr marL="0" indent="0" algn="ctr">
@@ -3686,7 +3767,6 @@
               <a:rPr lang="en-US" dirty="0" smtClean="0"/>
               <a:t>Mention: SoCal Code Camp</a:t>
             </a:r>
-            <a:endParaRPr lang="en-US" dirty="0" smtClean="0"/>
           </a:p>
           <a:p>
             <a:pPr marL="0" indent="0" algn="ctr">
@@ -3722,6 +3802,13 @@
   <p:clrMapOvr>
     <a:masterClrMapping/>
   </p:clrMapOvr>
+  <p:timing>
+    <p:tnLst>
+      <p:par>
+        <p:cTn id="1" dur="indefinite" restart="never" nodeType="tmRoot"/>
+      </p:par>
+    </p:tnLst>
+  </p:timing>
 </p:sld>
 </file>
 
@@ -3907,6 +3994,13 @@
   <p:clrMapOvr>
     <a:masterClrMapping/>
   </p:clrMapOvr>
+  <p:timing>
+    <p:tnLst>
+      <p:par>
+        <p:cTn id="1" dur="indefinite" restart="never" nodeType="tmRoot"/>
+      </p:par>
+    </p:tnLst>
+  </p:timing>
 </p:sld>
 </file>
 
@@ -4012,6 +4106,13 @@
   <p:clrMapOvr>
     <a:masterClrMapping/>
   </p:clrMapOvr>
+  <p:timing>
+    <p:tnLst>
+      <p:par>
+        <p:cTn id="1" dur="indefinite" restart="never" nodeType="tmRoot"/>
+      </p:par>
+    </p:tnLst>
+  </p:timing>
 </p:sld>
 </file>
 
@@ -4128,6 +4229,13 @@
   <p:clrMapOvr>
     <a:masterClrMapping/>
   </p:clrMapOvr>
+  <p:timing>
+    <p:tnLst>
+      <p:par>
+        <p:cTn id="1" dur="indefinite" restart="never" nodeType="tmRoot"/>
+      </p:par>
+    </p:tnLst>
+  </p:timing>
 </p:sld>
 </file>
 
@@ -4361,6 +4469,13 @@
   <p:clrMapOvr>
     <a:masterClrMapping/>
   </p:clrMapOvr>
+  <p:timing>
+    <p:tnLst>
+      <p:par>
+        <p:cTn id="1" dur="indefinite" restart="never" nodeType="tmRoot"/>
+      </p:par>
+    </p:tnLst>
+  </p:timing>
 </p:sld>
 </file>
 
@@ -4589,6 +4704,13 @@
   <p:clrMapOvr>
     <a:masterClrMapping/>
   </p:clrMapOvr>
+  <p:timing>
+    <p:tnLst>
+      <p:par>
+        <p:cTn id="1" dur="indefinite" restart="never" nodeType="tmRoot"/>
+      </p:par>
+    </p:tnLst>
+  </p:timing>
 </p:sld>
 </file>
 
@@ -4824,6 +4946,13 @@
   <p:clrMapOvr>
     <a:masterClrMapping/>
   </p:clrMapOvr>
+  <p:timing>
+    <p:tnLst>
+      <p:par>
+        <p:cTn id="1" dur="indefinite" restart="never" nodeType="tmRoot"/>
+      </p:par>
+    </p:tnLst>
+  </p:timing>
 </p:sld>
 </file>
 
@@ -4963,6 +5092,13 @@
   <p:clrMapOvr>
     <a:masterClrMapping/>
   </p:clrMapOvr>
+  <p:timing>
+    <p:tnLst>
+      <p:par>
+        <p:cTn id="1" dur="indefinite" restart="never" nodeType="tmRoot"/>
+      </p:par>
+    </p:tnLst>
+  </p:timing>
 </p:sld>
 </file>
 
@@ -5017,6 +5153,13 @@
   <p:clrMapOvr>
     <a:masterClrMapping/>
   </p:clrMapOvr>
+  <p:timing>
+    <p:tnLst>
+      <p:par>
+        <p:cTn id="1" dur="indefinite" restart="never" nodeType="tmRoot"/>
+      </p:par>
+    </p:tnLst>
+  </p:timing>
 </p:sld>
 </file>
 

</xml_diff>

<commit_message>
-Added new C# UI projects created directly in VS2015 (Now possible) -Updated slides to reflect this new information -Lots of Auto Changes
</commit_message>
<xml_diff>
--- a/FSharpXamarin_Slides.pptx
+++ b/FSharpXamarin_Slides.pptx
@@ -7,19 +7,24 @@
   <p:sldIdLst>
     <p:sldId id="256" r:id="rId2"/>
     <p:sldId id="264" r:id="rId3"/>
-    <p:sldId id="267" r:id="rId4"/>
-    <p:sldId id="257" r:id="rId5"/>
-    <p:sldId id="258" r:id="rId6"/>
-    <p:sldId id="259" r:id="rId7"/>
-    <p:sldId id="260" r:id="rId8"/>
-    <p:sldId id="261" r:id="rId9"/>
-    <p:sldId id="269" r:id="rId10"/>
-    <p:sldId id="270" r:id="rId11"/>
-    <p:sldId id="262" r:id="rId12"/>
-    <p:sldId id="268" r:id="rId13"/>
-    <p:sldId id="263" r:id="rId14"/>
-    <p:sldId id="271" r:id="rId15"/>
-    <p:sldId id="266" r:id="rId16"/>
+    <p:sldId id="257" r:id="rId4"/>
+    <p:sldId id="258" r:id="rId5"/>
+    <p:sldId id="259" r:id="rId6"/>
+    <p:sldId id="260" r:id="rId7"/>
+    <p:sldId id="261" r:id="rId8"/>
+    <p:sldId id="269" r:id="rId9"/>
+    <p:sldId id="278" r:id="rId10"/>
+    <p:sldId id="275" r:id="rId11"/>
+    <p:sldId id="277" r:id="rId12"/>
+    <p:sldId id="276" r:id="rId13"/>
+    <p:sldId id="279" r:id="rId14"/>
+    <p:sldId id="274" r:id="rId15"/>
+    <p:sldId id="262" r:id="rId16"/>
+    <p:sldId id="268" r:id="rId17"/>
+    <p:sldId id="263" r:id="rId18"/>
+    <p:sldId id="271" r:id="rId19"/>
+    <p:sldId id="267" r:id="rId20"/>
+    <p:sldId id="266" r:id="rId21"/>
   </p:sldIdLst>
   <p:sldSz cx="12192000" cy="6858000"/>
   <p:notesSz cx="6858000" cy="9144000"/>
@@ -2540,6 +2545,29 @@
           <a:chExt cx="0" cy="0"/>
         </a:xfrm>
       </p:grpSpPr>
+      <p:sp>
+        <p:nvSpPr>
+          <p:cNvPr id="2" name="Title 1"/>
+          <p:cNvSpPr>
+            <a:spLocks noGrp="1"/>
+          </p:cNvSpPr>
+          <p:nvPr>
+            <p:ph type="title"/>
+          </p:nvPr>
+        </p:nvSpPr>
+        <p:spPr/>
+        <p:txBody>
+          <a:bodyPr/>
+          <a:lstStyle/>
+          <a:p>
+            <a:r>
+              <a:rPr lang="en-US" dirty="0" smtClean="0"/>
+              <a:t>Change Target Version of F#</a:t>
+            </a:r>
+            <a:endParaRPr lang="en-US" dirty="0"/>
+          </a:p>
+        </p:txBody>
+      </p:sp>
       <p:pic>
         <p:nvPicPr>
           <p:cNvPr id="3" name="Picture 2"/>
@@ -2556,8 +2584,8 @@
         </p:blipFill>
         <p:spPr>
           <a:xfrm>
-            <a:off x="1614487" y="338137"/>
-            <a:ext cx="8963025" cy="6181725"/>
+            <a:off x="375293" y="2071776"/>
+            <a:ext cx="11441414" cy="3098116"/>
           </a:xfrm>
           <a:prstGeom prst="rect">
             <a:avLst/>
@@ -2567,20 +2595,13 @@
     </p:spTree>
     <p:extLst>
       <p:ext uri="{BB962C8B-B14F-4D97-AF65-F5344CB8AC3E}">
-        <p14:creationId xmlns:p14="http://schemas.microsoft.com/office/powerpoint/2010/main" val="1965307027"/>
+        <p14:creationId xmlns:p14="http://schemas.microsoft.com/office/powerpoint/2010/main" val="2397700932"/>
       </p:ext>
     </p:extLst>
   </p:cSld>
   <p:clrMapOvr>
     <a:masterClrMapping/>
   </p:clrMapOvr>
-  <p:timing>
-    <p:tnLst>
-      <p:par>
-        <p:cTn id="1" dur="indefinite" restart="never" nodeType="tmRoot"/>
-      </p:par>
-    </p:tnLst>
-  </p:timing>
 </p:sld>
 </file>
 
@@ -2613,6 +2634,664 @@
         </p:nvSpPr>
         <p:spPr/>
         <p:txBody>
+          <a:bodyPr>
+            <a:normAutofit fontScale="90000"/>
+          </a:bodyPr>
+          <a:lstStyle/>
+          <a:p>
+            <a:r>
+              <a:rPr lang="en-US" dirty="0" smtClean="0"/>
+              <a:t>Change Minimum Android to target: </a:t>
+            </a:r>
+            <a:br>
+              <a:rPr lang="en-US" dirty="0" smtClean="0"/>
+            </a:br>
+            <a:r>
+              <a:rPr lang="en-US" dirty="0" smtClean="0"/>
+              <a:t>Use Compile using SDK version</a:t>
+            </a:r>
+            <a:endParaRPr lang="en-US" dirty="0"/>
+          </a:p>
+        </p:txBody>
+      </p:sp>
+      <p:pic>
+        <p:nvPicPr>
+          <p:cNvPr id="3" name="Picture 2"/>
+          <p:cNvPicPr>
+            <a:picLocks noChangeAspect="1"/>
+          </p:cNvPicPr>
+          <p:nvPr/>
+        </p:nvPicPr>
+        <p:blipFill>
+          <a:blip r:embed="rId2"/>
+          <a:stretch>
+            <a:fillRect/>
+          </a:stretch>
+        </p:blipFill>
+        <p:spPr>
+          <a:xfrm>
+            <a:off x="246398" y="1814730"/>
+            <a:ext cx="11699204" cy="4448269"/>
+          </a:xfrm>
+          <a:prstGeom prst="rect">
+            <a:avLst/>
+          </a:prstGeom>
+        </p:spPr>
+      </p:pic>
+    </p:spTree>
+    <p:extLst>
+      <p:ext uri="{BB962C8B-B14F-4D97-AF65-F5344CB8AC3E}">
+        <p14:creationId xmlns:p14="http://schemas.microsoft.com/office/powerpoint/2010/main" val="2252782423"/>
+      </p:ext>
+    </p:extLst>
+  </p:cSld>
+  <p:clrMapOvr>
+    <a:masterClrMapping/>
+  </p:clrMapOvr>
+</p:sld>
+</file>
+
+<file path=ppt/slides/slide12.xml><?xml version="1.0" encoding="utf-8"?>
+<p:sld xmlns:a="http://schemas.openxmlformats.org/drawingml/2006/main" xmlns:r="http://schemas.openxmlformats.org/officeDocument/2006/relationships" xmlns:p="http://schemas.openxmlformats.org/presentationml/2006/main">
+  <p:cSld>
+    <p:spTree>
+      <p:nvGrpSpPr>
+        <p:cNvPr id="1" name=""/>
+        <p:cNvGrpSpPr/>
+        <p:nvPr/>
+      </p:nvGrpSpPr>
+      <p:grpSpPr>
+        <a:xfrm>
+          <a:off x="0" y="0"/>
+          <a:ext cx="0" cy="0"/>
+          <a:chOff x="0" y="0"/>
+          <a:chExt cx="0" cy="0"/>
+        </a:xfrm>
+      </p:grpSpPr>
+      <p:pic>
+        <p:nvPicPr>
+          <p:cNvPr id="4" name="Picture 3"/>
+          <p:cNvPicPr>
+            <a:picLocks noChangeAspect="1"/>
+          </p:cNvPicPr>
+          <p:nvPr/>
+        </p:nvPicPr>
+        <p:blipFill>
+          <a:blip r:embed="rId2"/>
+          <a:stretch>
+            <a:fillRect/>
+          </a:stretch>
+        </p:blipFill>
+        <p:spPr>
+          <a:xfrm>
+            <a:off x="583284" y="1417638"/>
+            <a:ext cx="11025432" cy="4539884"/>
+          </a:xfrm>
+          <a:prstGeom prst="rect">
+            <a:avLst/>
+          </a:prstGeom>
+        </p:spPr>
+      </p:pic>
+      <p:sp>
+        <p:nvSpPr>
+          <p:cNvPr id="5" name="Title 4"/>
+          <p:cNvSpPr>
+            <a:spLocks noGrp="1"/>
+          </p:cNvSpPr>
+          <p:nvPr>
+            <p:ph type="title"/>
+          </p:nvPr>
+        </p:nvSpPr>
+        <p:spPr/>
+        <p:txBody>
+          <a:bodyPr/>
+          <a:lstStyle/>
+          <a:p>
+            <a:r>
+              <a:rPr lang="en-US" dirty="0" smtClean="0"/>
+              <a:t>Change Package name &amp; Application Icon</a:t>
+            </a:r>
+            <a:endParaRPr lang="en-US" dirty="0"/>
+          </a:p>
+        </p:txBody>
+      </p:sp>
+    </p:spTree>
+    <p:extLst>
+      <p:ext uri="{BB962C8B-B14F-4D97-AF65-F5344CB8AC3E}">
+        <p14:creationId xmlns:p14="http://schemas.microsoft.com/office/powerpoint/2010/main" val="230997310"/>
+      </p:ext>
+    </p:extLst>
+  </p:cSld>
+  <p:clrMapOvr>
+    <a:masterClrMapping/>
+  </p:clrMapOvr>
+</p:sld>
+</file>
+
+<file path=ppt/slides/slide13.xml><?xml version="1.0" encoding="utf-8"?>
+<p:sld xmlns:a="http://schemas.openxmlformats.org/drawingml/2006/main" xmlns:r="http://schemas.openxmlformats.org/officeDocument/2006/relationships" xmlns:p="http://schemas.openxmlformats.org/presentationml/2006/main">
+  <p:cSld>
+    <p:spTree>
+      <p:nvGrpSpPr>
+        <p:cNvPr id="1" name=""/>
+        <p:cNvGrpSpPr/>
+        <p:nvPr/>
+      </p:nvGrpSpPr>
+      <p:grpSpPr>
+        <a:xfrm>
+          <a:off x="0" y="0"/>
+          <a:ext cx="0" cy="0"/>
+          <a:chOff x="0" y="0"/>
+          <a:chExt cx="0" cy="0"/>
+        </a:xfrm>
+      </p:grpSpPr>
+      <p:sp>
+        <p:nvSpPr>
+          <p:cNvPr id="2" name="Title 1"/>
+          <p:cNvSpPr>
+            <a:spLocks noGrp="1"/>
+          </p:cNvSpPr>
+          <p:nvPr>
+            <p:ph type="title"/>
+          </p:nvPr>
+        </p:nvSpPr>
+        <p:spPr/>
+        <p:txBody>
+          <a:bodyPr>
+            <a:normAutofit fontScale="90000"/>
+          </a:bodyPr>
+          <a:lstStyle/>
+          <a:p>
+            <a:r>
+              <a:rPr lang="en-US" dirty="0" smtClean="0"/>
+              <a:t>Create F# PCL to be used in C# or F# Projects</a:t>
+            </a:r>
+            <a:endParaRPr lang="en-US" dirty="0"/>
+          </a:p>
+        </p:txBody>
+      </p:sp>
+    </p:spTree>
+    <p:extLst>
+      <p:ext uri="{BB962C8B-B14F-4D97-AF65-F5344CB8AC3E}">
+        <p14:creationId xmlns:p14="http://schemas.microsoft.com/office/powerpoint/2010/main" val="4196540997"/>
+      </p:ext>
+    </p:extLst>
+  </p:cSld>
+  <p:clrMapOvr>
+    <a:masterClrMapping/>
+  </p:clrMapOvr>
+</p:sld>
+</file>
+
+<file path=ppt/slides/slide14.xml><?xml version="1.0" encoding="utf-8"?>
+<p:sld xmlns:a="http://schemas.openxmlformats.org/drawingml/2006/main" xmlns:r="http://schemas.openxmlformats.org/officeDocument/2006/relationships" xmlns:p="http://schemas.openxmlformats.org/presentationml/2006/main">
+  <p:cSld>
+    <p:spTree>
+      <p:nvGrpSpPr>
+        <p:cNvPr id="1" name=""/>
+        <p:cNvGrpSpPr/>
+        <p:nvPr/>
+      </p:nvGrpSpPr>
+      <p:grpSpPr>
+        <a:xfrm>
+          <a:off x="0" y="0"/>
+          <a:ext cx="0" cy="0"/>
+          <a:chOff x="0" y="0"/>
+          <a:chExt cx="0" cy="0"/>
+        </a:xfrm>
+      </p:grpSpPr>
+      <p:pic>
+        <p:nvPicPr>
+          <p:cNvPr id="3" name="Picture 2"/>
+          <p:cNvPicPr>
+            <a:picLocks noChangeAspect="1"/>
+          </p:cNvPicPr>
+          <p:nvPr/>
+        </p:nvPicPr>
+        <p:blipFill>
+          <a:blip r:embed="rId2"/>
+          <a:stretch>
+            <a:fillRect/>
+          </a:stretch>
+        </p:blipFill>
+        <p:spPr>
+          <a:xfrm>
+            <a:off x="1609725" y="314325"/>
+            <a:ext cx="8972550" cy="6229350"/>
+          </a:xfrm>
+          <a:prstGeom prst="rect">
+            <a:avLst/>
+          </a:prstGeom>
+        </p:spPr>
+      </p:pic>
+      <p:sp>
+        <p:nvSpPr>
+          <p:cNvPr id="4" name="Rectangle 3"/>
+          <p:cNvSpPr/>
+          <p:nvPr/>
+        </p:nvSpPr>
+        <p:spPr>
+          <a:xfrm>
+            <a:off x="3716324" y="595618"/>
+            <a:ext cx="1543574" cy="327171"/>
+          </a:xfrm>
+          <a:prstGeom prst="rect">
+            <a:avLst/>
+          </a:prstGeom>
+          <a:noFill/>
+          <a:ln>
+            <a:solidFill>
+              <a:srgbClr val="FF0000"/>
+            </a:solidFill>
+          </a:ln>
+        </p:spPr>
+        <p:style>
+          <a:lnRef idx="2">
+            <a:schemeClr val="accent1">
+              <a:shade val="50000"/>
+            </a:schemeClr>
+          </a:lnRef>
+          <a:fillRef idx="1">
+            <a:schemeClr val="accent1"/>
+          </a:fillRef>
+          <a:effectRef idx="0">
+            <a:schemeClr val="accent1"/>
+          </a:effectRef>
+          <a:fontRef idx="minor">
+            <a:schemeClr val="lt1"/>
+          </a:fontRef>
+        </p:style>
+        <p:txBody>
+          <a:bodyPr rtlCol="0" anchor="ctr"/>
+          <a:lstStyle/>
+          <a:p>
+            <a:pPr algn="ctr"/>
+            <a:endParaRPr lang="en-US"/>
+          </a:p>
+        </p:txBody>
+      </p:sp>
+      <p:sp>
+        <p:nvSpPr>
+          <p:cNvPr id="6" name="Rectangle 5"/>
+          <p:cNvSpPr/>
+          <p:nvPr/>
+        </p:nvSpPr>
+        <p:spPr>
+          <a:xfrm>
+            <a:off x="1863755" y="3013046"/>
+            <a:ext cx="1022058" cy="1466675"/>
+          </a:xfrm>
+          <a:prstGeom prst="rect">
+            <a:avLst/>
+          </a:prstGeom>
+          <a:noFill/>
+          <a:ln>
+            <a:solidFill>
+              <a:srgbClr val="FF0000"/>
+            </a:solidFill>
+          </a:ln>
+        </p:spPr>
+        <p:style>
+          <a:lnRef idx="2">
+            <a:schemeClr val="accent1">
+              <a:shade val="50000"/>
+            </a:schemeClr>
+          </a:lnRef>
+          <a:fillRef idx="1">
+            <a:schemeClr val="accent1"/>
+          </a:fillRef>
+          <a:effectRef idx="0">
+            <a:schemeClr val="accent1"/>
+          </a:effectRef>
+          <a:fontRef idx="minor">
+            <a:schemeClr val="lt1"/>
+          </a:fontRef>
+        </p:style>
+        <p:txBody>
+          <a:bodyPr rtlCol="0" anchor="ctr"/>
+          <a:lstStyle/>
+          <a:p>
+            <a:pPr algn="ctr"/>
+            <a:endParaRPr lang="en-US"/>
+          </a:p>
+        </p:txBody>
+      </p:sp>
+      <p:sp>
+        <p:nvSpPr>
+          <p:cNvPr id="7" name="Rectangle 6"/>
+          <p:cNvSpPr/>
+          <p:nvPr/>
+        </p:nvSpPr>
+        <p:spPr>
+          <a:xfrm>
+            <a:off x="3825381" y="1686187"/>
+            <a:ext cx="5519955" cy="293615"/>
+          </a:xfrm>
+          <a:prstGeom prst="rect">
+            <a:avLst/>
+          </a:prstGeom>
+          <a:noFill/>
+          <a:ln>
+            <a:solidFill>
+              <a:srgbClr val="FF0000"/>
+            </a:solidFill>
+          </a:ln>
+        </p:spPr>
+        <p:style>
+          <a:lnRef idx="2">
+            <a:schemeClr val="accent1">
+              <a:shade val="50000"/>
+            </a:schemeClr>
+          </a:lnRef>
+          <a:fillRef idx="1">
+            <a:schemeClr val="accent1"/>
+          </a:fillRef>
+          <a:effectRef idx="0">
+            <a:schemeClr val="accent1"/>
+          </a:effectRef>
+          <a:fontRef idx="minor">
+            <a:schemeClr val="lt1"/>
+          </a:fontRef>
+        </p:style>
+        <p:txBody>
+          <a:bodyPr rtlCol="0" anchor="ctr"/>
+          <a:lstStyle/>
+          <a:p>
+            <a:pPr algn="ctr"/>
+            <a:endParaRPr lang="en-US"/>
+          </a:p>
+        </p:txBody>
+      </p:sp>
+      <p:sp>
+        <p:nvSpPr>
+          <p:cNvPr id="8" name="Rectangle 7"/>
+          <p:cNvSpPr/>
+          <p:nvPr/>
+        </p:nvSpPr>
+        <p:spPr>
+          <a:xfrm>
+            <a:off x="3003259" y="-106016"/>
+            <a:ext cx="6402202" cy="830997"/>
+          </a:xfrm>
+          <a:prstGeom prst="rect">
+            <a:avLst/>
+          </a:prstGeom>
+          <a:noFill/>
+        </p:spPr>
+        <p:txBody>
+          <a:bodyPr wrap="none" lIns="91440" tIns="45720" rIns="91440" bIns="45720">
+            <a:spAutoFit/>
+          </a:bodyPr>
+          <a:lstStyle/>
+          <a:p>
+            <a:pPr algn="ctr"/>
+            <a:r>
+              <a:rPr lang="en-US" sz="4800" b="0" cap="none" spc="0" dirty="0" smtClean="0">
+                <a:ln w="0"/>
+                <a:solidFill>
+                  <a:schemeClr val="tx1"/>
+                </a:solidFill>
+                <a:effectLst>
+                  <a:outerShdw blurRad="38100" dist="19050" dir="2700000" algn="tl" rotWithShape="0">
+                    <a:schemeClr val="dk1">
+                      <a:alpha val="40000"/>
+                    </a:schemeClr>
+                  </a:outerShdw>
+                </a:effectLst>
+              </a:rPr>
+              <a:t>Select .NET Framework 4</a:t>
+            </a:r>
+            <a:endParaRPr lang="en-US" sz="4800" b="0" cap="none" spc="0" dirty="0">
+              <a:ln w="0"/>
+              <a:solidFill>
+                <a:schemeClr val="tx1"/>
+              </a:solidFill>
+              <a:effectLst>
+                <a:outerShdw blurRad="38100" dist="19050" dir="2700000" algn="tl" rotWithShape="0">
+                  <a:schemeClr val="dk1">
+                    <a:alpha val="40000"/>
+                  </a:schemeClr>
+                </a:outerShdw>
+              </a:effectLst>
+            </a:endParaRPr>
+          </a:p>
+        </p:txBody>
+      </p:sp>
+      <p:sp>
+        <p:nvSpPr>
+          <p:cNvPr id="9" name="Rectangle 8"/>
+          <p:cNvSpPr/>
+          <p:nvPr/>
+        </p:nvSpPr>
+        <p:spPr>
+          <a:xfrm>
+            <a:off x="4084407" y="2035400"/>
+            <a:ext cx="6497868" cy="1754326"/>
+          </a:xfrm>
+          <a:prstGeom prst="rect">
+            <a:avLst/>
+          </a:prstGeom>
+          <a:noFill/>
+        </p:spPr>
+        <p:txBody>
+          <a:bodyPr wrap="none" lIns="91440" tIns="45720" rIns="91440" bIns="45720">
+            <a:spAutoFit/>
+          </a:bodyPr>
+          <a:lstStyle/>
+          <a:p>
+            <a:pPr algn="ctr"/>
+            <a:r>
+              <a:rPr lang="en-US" sz="5400" b="0" cap="none" spc="0" dirty="0" smtClean="0">
+                <a:ln w="0"/>
+                <a:solidFill>
+                  <a:schemeClr val="tx1"/>
+                </a:solidFill>
+                <a:effectLst>
+                  <a:outerShdw blurRad="38100" dist="19050" dir="2700000" algn="tl" rotWithShape="0">
+                    <a:schemeClr val="dk1">
+                      <a:alpha val="40000"/>
+                    </a:schemeClr>
+                  </a:outerShdw>
+                </a:effectLst>
+              </a:rPr>
+              <a:t>Select Portable Library</a:t>
+            </a:r>
+          </a:p>
+          <a:p>
+            <a:pPr algn="ctr"/>
+            <a:r>
+              <a:rPr lang="en-US" sz="5400" dirty="0" smtClean="0">
+                <a:ln w="0"/>
+                <a:effectLst>
+                  <a:outerShdw blurRad="38100" dist="19050" dir="2700000" algn="tl" rotWithShape="0">
+                    <a:schemeClr val="dk1">
+                      <a:alpha val="40000"/>
+                    </a:schemeClr>
+                  </a:outerShdw>
+                </a:effectLst>
+              </a:rPr>
+              <a:t>With Profile 47</a:t>
+            </a:r>
+            <a:endParaRPr lang="en-US" sz="5400" b="0" cap="none" spc="0" dirty="0">
+              <a:ln w="0"/>
+              <a:solidFill>
+                <a:schemeClr val="tx1"/>
+              </a:solidFill>
+              <a:effectLst>
+                <a:outerShdw blurRad="38100" dist="19050" dir="2700000" algn="tl" rotWithShape="0">
+                  <a:schemeClr val="dk1">
+                    <a:alpha val="40000"/>
+                  </a:schemeClr>
+                </a:outerShdw>
+              </a:effectLst>
+            </a:endParaRPr>
+          </a:p>
+        </p:txBody>
+      </p:sp>
+      <p:sp>
+        <p:nvSpPr>
+          <p:cNvPr id="12" name="Rectangle 11"/>
+          <p:cNvSpPr/>
+          <p:nvPr/>
+        </p:nvSpPr>
+        <p:spPr>
+          <a:xfrm>
+            <a:off x="0" y="1585519"/>
+            <a:ext cx="3003259" cy="1402360"/>
+          </a:xfrm>
+          <a:prstGeom prst="rect">
+            <a:avLst/>
+          </a:prstGeom>
+          <a:solidFill>
+            <a:schemeClr val="bg1"/>
+          </a:solidFill>
+          <a:ln>
+            <a:solidFill>
+              <a:schemeClr val="bg1"/>
+            </a:solidFill>
+          </a:ln>
+        </p:spPr>
+        <p:style>
+          <a:lnRef idx="2">
+            <a:schemeClr val="accent1">
+              <a:shade val="50000"/>
+            </a:schemeClr>
+          </a:lnRef>
+          <a:fillRef idx="1">
+            <a:schemeClr val="accent1"/>
+          </a:fillRef>
+          <a:effectRef idx="0">
+            <a:schemeClr val="accent1"/>
+          </a:effectRef>
+          <a:fontRef idx="minor">
+            <a:schemeClr val="lt1"/>
+          </a:fontRef>
+        </p:style>
+        <p:txBody>
+          <a:bodyPr rtlCol="0" anchor="ctr"/>
+          <a:lstStyle/>
+          <a:p>
+            <a:pPr algn="ctr"/>
+            <a:endParaRPr lang="en-US"/>
+          </a:p>
+        </p:txBody>
+      </p:sp>
+      <p:sp>
+        <p:nvSpPr>
+          <p:cNvPr id="10" name="Rectangle 9"/>
+          <p:cNvSpPr/>
+          <p:nvPr/>
+        </p:nvSpPr>
+        <p:spPr>
+          <a:xfrm>
+            <a:off x="0" y="1362529"/>
+            <a:ext cx="3077316" cy="1754326"/>
+          </a:xfrm>
+          <a:prstGeom prst="rect">
+            <a:avLst/>
+          </a:prstGeom>
+          <a:noFill/>
+        </p:spPr>
+        <p:txBody>
+          <a:bodyPr wrap="none" lIns="91440" tIns="45720" rIns="91440" bIns="45720">
+            <a:spAutoFit/>
+          </a:bodyPr>
+          <a:lstStyle/>
+          <a:p>
+            <a:pPr algn="ctr"/>
+            <a:r>
+              <a:rPr lang="en-US" sz="5400" b="0" cap="none" spc="0" dirty="0" smtClean="0">
+                <a:ln w="0"/>
+                <a:solidFill>
+                  <a:schemeClr val="tx1"/>
+                </a:solidFill>
+                <a:effectLst>
+                  <a:outerShdw blurRad="38100" dist="19050" dir="2700000" algn="tl" rotWithShape="0">
+                    <a:schemeClr val="dk1">
+                      <a:alpha val="40000"/>
+                    </a:schemeClr>
+                  </a:outerShdw>
+                </a:effectLst>
+              </a:rPr>
+              <a:t>Visual F#</a:t>
+            </a:r>
+          </a:p>
+          <a:p>
+            <a:pPr algn="ctr"/>
+            <a:r>
+              <a:rPr lang="en-US" sz="5400" b="0" cap="none" spc="0" dirty="0" smtClean="0">
+                <a:ln w="0"/>
+                <a:solidFill>
+                  <a:schemeClr val="tx1"/>
+                </a:solidFill>
+                <a:effectLst>
+                  <a:outerShdw blurRad="38100" dist="19050" dir="2700000" algn="tl" rotWithShape="0">
+                    <a:schemeClr val="dk1">
+                      <a:alpha val="40000"/>
+                    </a:schemeClr>
+                  </a:outerShdw>
+                </a:effectLst>
+              </a:rPr>
+              <a:t>/Windows</a:t>
+            </a:r>
+            <a:endParaRPr lang="en-US" sz="5400" b="0" cap="none" spc="0" dirty="0">
+              <a:ln w="0"/>
+              <a:solidFill>
+                <a:schemeClr val="tx1"/>
+              </a:solidFill>
+              <a:effectLst>
+                <a:outerShdw blurRad="38100" dist="19050" dir="2700000" algn="tl" rotWithShape="0">
+                  <a:schemeClr val="dk1">
+                    <a:alpha val="40000"/>
+                  </a:schemeClr>
+                </a:outerShdw>
+              </a:effectLst>
+            </a:endParaRPr>
+          </a:p>
+        </p:txBody>
+      </p:sp>
+    </p:spTree>
+    <p:extLst>
+      <p:ext uri="{BB962C8B-B14F-4D97-AF65-F5344CB8AC3E}">
+        <p14:creationId xmlns:p14="http://schemas.microsoft.com/office/powerpoint/2010/main" val="2525050295"/>
+      </p:ext>
+    </p:extLst>
+  </p:cSld>
+  <p:clrMapOvr>
+    <a:masterClrMapping/>
+  </p:clrMapOvr>
+</p:sld>
+</file>
+
+<file path=ppt/slides/slide15.xml><?xml version="1.0" encoding="utf-8"?>
+<p:sld xmlns:a="http://schemas.openxmlformats.org/drawingml/2006/main" xmlns:r="http://schemas.openxmlformats.org/officeDocument/2006/relationships" xmlns:p="http://schemas.openxmlformats.org/presentationml/2006/main">
+  <p:cSld>
+    <p:spTree>
+      <p:nvGrpSpPr>
+        <p:cNvPr id="1" name=""/>
+        <p:cNvGrpSpPr/>
+        <p:nvPr/>
+      </p:nvGrpSpPr>
+      <p:grpSpPr>
+        <a:xfrm>
+          <a:off x="0" y="0"/>
+          <a:ext cx="0" cy="0"/>
+          <a:chOff x="0" y="0"/>
+          <a:chExt cx="0" cy="0"/>
+        </a:xfrm>
+      </p:grpSpPr>
+      <p:sp>
+        <p:nvSpPr>
+          <p:cNvPr id="2" name="Title 1"/>
+          <p:cNvSpPr>
+            <a:spLocks noGrp="1"/>
+          </p:cNvSpPr>
+          <p:nvPr>
+            <p:ph type="title"/>
+          </p:nvPr>
+        </p:nvSpPr>
+        <p:spPr/>
+        <p:txBody>
           <a:bodyPr/>
           <a:lstStyle/>
           <a:p>
@@ -2751,7 +3430,7 @@
 </p:sld>
 </file>
 
-<file path=ppt/slides/slide12.xml><?xml version="1.0" encoding="utf-8"?>
+<file path=ppt/slides/slide16.xml><?xml version="1.0" encoding="utf-8"?>
 <p:sld xmlns:a="http://schemas.openxmlformats.org/drawingml/2006/main" xmlns:r="http://schemas.openxmlformats.org/officeDocument/2006/relationships" xmlns:p="http://schemas.openxmlformats.org/presentationml/2006/main">
   <p:cSld>
     <p:spTree>
@@ -2847,7 +3526,7 @@
 </p:sld>
 </file>
 
-<file path=ppt/slides/slide13.xml><?xml version="1.0" encoding="utf-8"?>
+<file path=ppt/slides/slide17.xml><?xml version="1.0" encoding="utf-8"?>
 <p:sld xmlns:a="http://schemas.openxmlformats.org/drawingml/2006/main" xmlns:r="http://schemas.openxmlformats.org/officeDocument/2006/relationships" xmlns:p="http://schemas.openxmlformats.org/presentationml/2006/main">
   <p:cSld>
     <p:spTree>
@@ -2971,7 +3650,7 @@
             <a:pPr lvl="1"/>
             <a:r>
               <a:rPr lang="en-US" dirty="0" smtClean="0"/>
-              <a:t>Don’t be an C# militant, do your research! Open your mind!</a:t>
+              <a:t>Don’t be a C# militant, do your research! Open your mind!</a:t>
             </a:r>
           </a:p>
           <a:p>
@@ -3037,7 +3716,7 @@
 </p:sld>
 </file>
 
-<file path=ppt/slides/slide14.xml><?xml version="1.0" encoding="utf-8"?>
+<file path=ppt/slides/slide18.xml><?xml version="1.0" encoding="utf-8"?>
 <p:sld xmlns:a="http://schemas.openxmlformats.org/drawingml/2006/main" xmlns:r="http://schemas.openxmlformats.org/officeDocument/2006/relationships" xmlns:p="http://schemas.openxmlformats.org/presentationml/2006/main">
   <p:cSld>
     <p:spTree>
@@ -3181,7 +3860,487 @@
 </p:sld>
 </file>
 
-<file path=ppt/slides/slide15.xml><?xml version="1.0" encoding="utf-8"?>
+<file path=ppt/slides/slide19.xml><?xml version="1.0" encoding="utf-8"?>
+<p:sld xmlns:a="http://schemas.openxmlformats.org/drawingml/2006/main" xmlns:r="http://schemas.openxmlformats.org/officeDocument/2006/relationships" xmlns:p="http://schemas.openxmlformats.org/presentationml/2006/main">
+  <p:cSld>
+    <p:spTree>
+      <p:nvGrpSpPr>
+        <p:cNvPr id="1" name=""/>
+        <p:cNvGrpSpPr/>
+        <p:nvPr/>
+      </p:nvGrpSpPr>
+      <p:grpSpPr>
+        <a:xfrm>
+          <a:off x="0" y="0"/>
+          <a:ext cx="0" cy="0"/>
+          <a:chOff x="0" y="0"/>
+          <a:chExt cx="0" cy="0"/>
+        </a:xfrm>
+      </p:grpSpPr>
+      <p:sp>
+        <p:nvSpPr>
+          <p:cNvPr id="2" name="Title 1"/>
+          <p:cNvSpPr>
+            <a:spLocks noGrp="1"/>
+          </p:cNvSpPr>
+          <p:nvPr>
+            <p:ph type="title"/>
+          </p:nvPr>
+        </p:nvSpPr>
+        <p:spPr/>
+        <p:txBody>
+          <a:bodyPr/>
+          <a:lstStyle/>
+          <a:p>
+            <a:r>
+              <a:rPr lang="en-US" dirty="0" smtClean="0"/>
+              <a:t>Materials</a:t>
+            </a:r>
+            <a:endParaRPr lang="en-US" dirty="0"/>
+          </a:p>
+        </p:txBody>
+      </p:sp>
+      <p:sp>
+        <p:nvSpPr>
+          <p:cNvPr id="3" name="Content Placeholder 2"/>
+          <p:cNvSpPr>
+            <a:spLocks noGrp="1"/>
+          </p:cNvSpPr>
+          <p:nvPr>
+            <p:ph idx="1"/>
+          </p:nvPr>
+        </p:nvSpPr>
+        <p:spPr/>
+        <p:txBody>
+          <a:bodyPr>
+            <a:normAutofit fontScale="62500" lnSpcReduction="20000"/>
+          </a:bodyPr>
+          <a:lstStyle/>
+          <a:p>
+            <a:r>
+              <a:rPr lang="en-US" dirty="0"/>
+              <a:t>Xamarin Support Overview</a:t>
+            </a:r>
+          </a:p>
+          <a:p>
+            <a:pPr lvl="1"/>
+            <a:r>
+              <a:rPr lang="en-US" dirty="0">
+                <a:hlinkClick r:id="rId2"/>
+              </a:rPr>
+              <a:t>http://developer.xamarin.com/guides/cross-platform/fsharp/fsharp_support_overview/</a:t>
+            </a:r>
+            <a:endParaRPr lang="en-US" dirty="0"/>
+          </a:p>
+          <a:p>
+            <a:r>
+              <a:rPr lang="en-US" dirty="0"/>
+              <a:t>F# </a:t>
+            </a:r>
+            <a:r>
+              <a:rPr lang="en-US" dirty="0" err="1"/>
+              <a:t>Async</a:t>
+            </a:r>
+            <a:r>
+              <a:rPr lang="en-US" dirty="0"/>
+              <a:t> is a bit different than C# </a:t>
+            </a:r>
+            <a:r>
+              <a:rPr lang="en-US" dirty="0" err="1"/>
+              <a:t>Async</a:t>
+            </a:r>
+            <a:endParaRPr lang="en-US" dirty="0"/>
+          </a:p>
+          <a:p>
+            <a:pPr lvl="1"/>
+            <a:r>
+              <a:rPr lang="en-US" dirty="0">
+                <a:hlinkClick r:id="rId3"/>
+              </a:rPr>
+              <a:t>http://stackoverflow.com/questions/13063792/windows-store-apps-and-f</a:t>
+            </a:r>
+            <a:endParaRPr lang="en-US" dirty="0"/>
+          </a:p>
+          <a:p>
+            <a:pPr lvl="1"/>
+            <a:r>
+              <a:rPr lang="en-US" dirty="0">
+                <a:hlinkClick r:id="rId4"/>
+              </a:rPr>
+              <a:t>http://</a:t>
+            </a:r>
+            <a:r>
+              <a:rPr lang="en-US" dirty="0" smtClean="0">
+                <a:hlinkClick r:id="rId4"/>
+              </a:rPr>
+              <a:t>stackoverflow.com/questions/6811072/referencing-asynchronous-f-datatype-from-c-sharp</a:t>
+            </a:r>
+            <a:endParaRPr lang="en-US" dirty="0"/>
+          </a:p>
+          <a:p>
+            <a:r>
+              <a:rPr lang="en-US" dirty="0" smtClean="0"/>
+              <a:t>Always </a:t>
+            </a:r>
+            <a:r>
+              <a:rPr lang="en-US" dirty="0"/>
+              <a:t>5 Equation</a:t>
+            </a:r>
+          </a:p>
+          <a:p>
+            <a:pPr lvl="1"/>
+            <a:r>
+              <a:rPr lang="en-US" dirty="0">
+                <a:hlinkClick r:id="rId5"/>
+              </a:rPr>
+              <a:t>http://</a:t>
+            </a:r>
+            <a:r>
+              <a:rPr lang="en-US" dirty="0" smtClean="0">
+                <a:hlinkClick r:id="rId5"/>
+              </a:rPr>
+              <a:t>www.pedagonet.com/maths/always.htm</a:t>
+            </a:r>
+            <a:endParaRPr lang="en-US" dirty="0"/>
+          </a:p>
+          <a:p>
+            <a:r>
+              <a:rPr lang="en-US" dirty="0" smtClean="0"/>
+              <a:t>The Book of F#, By </a:t>
+            </a:r>
+            <a:r>
+              <a:rPr lang="en-US" dirty="0"/>
+              <a:t>Dave Fancher </a:t>
+            </a:r>
+            <a:r>
+              <a:rPr lang="en-US" dirty="0" smtClean="0"/>
+              <a:t>(</a:t>
+            </a:r>
+            <a:r>
+              <a:rPr lang="en-US" dirty="0" smtClean="0">
+                <a:hlinkClick r:id="rId6"/>
+              </a:rPr>
+              <a:t>https</a:t>
+            </a:r>
+            <a:r>
+              <a:rPr lang="en-US" dirty="0">
+                <a:hlinkClick r:id="rId6"/>
+              </a:rPr>
+              <a:t>://</a:t>
+            </a:r>
+            <a:r>
+              <a:rPr lang="en-US" dirty="0" smtClean="0">
+                <a:hlinkClick r:id="rId6"/>
+              </a:rPr>
+              <a:t>twitter.com/davefancher</a:t>
+            </a:r>
+            <a:r>
+              <a:rPr lang="en-US" dirty="0" smtClean="0"/>
+              <a:t>)</a:t>
+            </a:r>
+            <a:endParaRPr lang="en-US" dirty="0"/>
+          </a:p>
+          <a:p>
+            <a:r>
+              <a:rPr lang="en-US" dirty="0" smtClean="0"/>
+              <a:t>Gist about Discriminated Union</a:t>
+            </a:r>
+          </a:p>
+          <a:p>
+            <a:pPr lvl="1"/>
+            <a:r>
+              <a:rPr lang="en-US" dirty="0" smtClean="0">
+                <a:hlinkClick r:id="rId7"/>
+              </a:rPr>
+              <a:t>https</a:t>
+            </a:r>
+            <a:r>
+              <a:rPr lang="en-US" dirty="0">
+                <a:hlinkClick r:id="rId7"/>
+              </a:rPr>
+              <a:t>://</a:t>
+            </a:r>
+            <a:r>
+              <a:rPr lang="en-US" dirty="0" smtClean="0">
+                <a:hlinkClick r:id="rId7"/>
+              </a:rPr>
+              <a:t>gist.github.com/dannydwarren/cefb9d33a67b689bddf8</a:t>
+            </a:r>
+            <a:endParaRPr lang="en-US" dirty="0" smtClean="0"/>
+          </a:p>
+          <a:p>
+            <a:r>
+              <a:rPr lang="en-US" dirty="0" smtClean="0"/>
+              <a:t>Pipe |&gt; vs Function Composition &gt;&gt;</a:t>
+            </a:r>
+          </a:p>
+          <a:p>
+            <a:pPr lvl="1"/>
+            <a:r>
+              <a:rPr lang="en-US" dirty="0">
+                <a:hlinkClick r:id="rId8"/>
+              </a:rPr>
+              <a:t>http://fsharpforfunandprofit.com/posts/function-composition</a:t>
+            </a:r>
+            <a:r>
+              <a:rPr lang="en-US" dirty="0" smtClean="0">
+                <a:hlinkClick r:id="rId8"/>
+              </a:rPr>
+              <a:t>/</a:t>
+            </a:r>
+            <a:r>
+              <a:rPr lang="en-US" dirty="0" smtClean="0"/>
+              <a:t> </a:t>
+            </a:r>
+          </a:p>
+          <a:p>
+            <a:r>
+              <a:rPr lang="en-US" dirty="0" smtClean="0"/>
+              <a:t>Visual Studio Emulator for Android </a:t>
+            </a:r>
+          </a:p>
+          <a:p>
+            <a:pPr lvl="1"/>
+            <a:r>
+              <a:rPr lang="en-US" dirty="0">
+                <a:hlinkClick r:id="rId9"/>
+              </a:rPr>
+              <a:t>https://blogs.msdn.microsoft.com/visualstudioalm/2014/11/12/introducing-visual-studios-emulator-for-android</a:t>
+            </a:r>
+            <a:r>
+              <a:rPr lang="en-US" dirty="0" smtClean="0">
+                <a:hlinkClick r:id="rId9"/>
+              </a:rPr>
+              <a:t>/</a:t>
+            </a:r>
+            <a:r>
+              <a:rPr lang="en-US" dirty="0" smtClean="0"/>
+              <a:t> </a:t>
+            </a:r>
+            <a:endParaRPr lang="en-US" dirty="0"/>
+          </a:p>
+          <a:p>
+            <a:endParaRPr lang="en-US" dirty="0"/>
+          </a:p>
+        </p:txBody>
+      </p:sp>
+    </p:spTree>
+    <p:extLst>
+      <p:ext uri="{BB962C8B-B14F-4D97-AF65-F5344CB8AC3E}">
+        <p14:creationId xmlns:p14="http://schemas.microsoft.com/office/powerpoint/2010/main" val="1803903495"/>
+      </p:ext>
+    </p:extLst>
+  </p:cSld>
+  <p:clrMapOvr>
+    <a:masterClrMapping/>
+  </p:clrMapOvr>
+  <p:timing>
+    <p:tnLst>
+      <p:par>
+        <p:cTn id="1" dur="indefinite" restart="never" nodeType="tmRoot"/>
+      </p:par>
+    </p:tnLst>
+  </p:timing>
+</p:sld>
+</file>
+
+<file path=ppt/slides/slide2.xml><?xml version="1.0" encoding="utf-8"?>
+<p:sld xmlns:a="http://schemas.openxmlformats.org/drawingml/2006/main" xmlns:r="http://schemas.openxmlformats.org/officeDocument/2006/relationships" xmlns:p="http://schemas.openxmlformats.org/presentationml/2006/main">
+  <p:cSld>
+    <p:spTree>
+      <p:nvGrpSpPr>
+        <p:cNvPr id="1" name=""/>
+        <p:cNvGrpSpPr/>
+        <p:nvPr/>
+      </p:nvGrpSpPr>
+      <p:grpSpPr>
+        <a:xfrm>
+          <a:off x="0" y="0"/>
+          <a:ext cx="0" cy="0"/>
+          <a:chOff x="0" y="0"/>
+          <a:chExt cx="0" cy="0"/>
+        </a:xfrm>
+      </p:grpSpPr>
+      <p:sp>
+        <p:nvSpPr>
+          <p:cNvPr id="2" name="Title 1"/>
+          <p:cNvSpPr>
+            <a:spLocks noGrp="1"/>
+          </p:cNvSpPr>
+          <p:nvPr>
+            <p:ph type="title"/>
+          </p:nvPr>
+        </p:nvSpPr>
+        <p:spPr/>
+        <p:txBody>
+          <a:bodyPr/>
+          <a:lstStyle/>
+          <a:p>
+            <a:r>
+              <a:rPr lang="en-US" dirty="0"/>
+              <a:t>About Danny &amp; InterKnowlogy</a:t>
+            </a:r>
+          </a:p>
+        </p:txBody>
+      </p:sp>
+      <p:sp>
+        <p:nvSpPr>
+          <p:cNvPr id="3" name="Content Placeholder 2"/>
+          <p:cNvSpPr>
+            <a:spLocks noGrp="1"/>
+          </p:cNvSpPr>
+          <p:nvPr>
+            <p:ph idx="1"/>
+          </p:nvPr>
+        </p:nvSpPr>
+        <p:spPr/>
+        <p:txBody>
+          <a:bodyPr>
+            <a:normAutofit fontScale="77500" lnSpcReduction="20000"/>
+          </a:bodyPr>
+          <a:lstStyle/>
+          <a:p>
+            <a:r>
+              <a:rPr lang="en-US" dirty="0"/>
+              <a:t>InterKnowlogy (</a:t>
+            </a:r>
+            <a:r>
+              <a:rPr lang="en-US" dirty="0">
+                <a:hlinkClick r:id="rId2"/>
+              </a:rPr>
+              <a:t>www.interknowlogy.com</a:t>
+            </a:r>
+            <a:r>
+              <a:rPr lang="en-US" dirty="0"/>
+              <a:t>)</a:t>
+            </a:r>
+          </a:p>
+          <a:p>
+            <a:pPr lvl="1"/>
+            <a:r>
+              <a:rPr lang="en-US" dirty="0"/>
+              <a:t>15 year old services firm – Custom Application Development</a:t>
+            </a:r>
+          </a:p>
+          <a:p>
+            <a:pPr lvl="1"/>
+            <a:r>
+              <a:rPr lang="en-US" dirty="0"/>
+              <a:t>Focused on building NUI solutions</a:t>
+            </a:r>
+          </a:p>
+          <a:p>
+            <a:pPr lvl="2"/>
+            <a:r>
+              <a:rPr lang="en-US" dirty="0"/>
+              <a:t>Universal Windows Platform </a:t>
+            </a:r>
+            <a:r>
+              <a:rPr lang="en-US" dirty="0" smtClean="0"/>
+              <a:t>(Desktop, Tablet, Phone), </a:t>
+            </a:r>
+            <a:r>
+              <a:rPr lang="en-US" dirty="0"/>
+              <a:t>Xamarin, WPF, Kinect, Azure</a:t>
+            </a:r>
+          </a:p>
+          <a:p>
+            <a:pPr lvl="2"/>
+            <a:r>
+              <a:rPr lang="en-US" dirty="0" smtClean="0"/>
+              <a:t>Touch, Gestures (Touchless), &amp; Mouse and Keyboard</a:t>
+            </a:r>
+          </a:p>
+          <a:p>
+            <a:pPr lvl="1"/>
+            <a:r>
+              <a:rPr lang="en-US" dirty="0" smtClean="0"/>
+              <a:t>Formal R&amp;D program: RECESS</a:t>
+            </a:r>
+          </a:p>
+          <a:p>
+            <a:pPr lvl="2"/>
+            <a:r>
+              <a:rPr lang="en-US" dirty="0" smtClean="0"/>
+              <a:t>Self </a:t>
+            </a:r>
+            <a:r>
+              <a:rPr lang="en-US" dirty="0"/>
+              <a:t>guided learning/My time to prepare this presentation</a:t>
+            </a:r>
+          </a:p>
+          <a:p>
+            <a:r>
+              <a:rPr lang="en-US" dirty="0"/>
+              <a:t>Danny Warren, Sr. Software Engineer</a:t>
+            </a:r>
+          </a:p>
+          <a:p>
+            <a:pPr lvl="1"/>
+            <a:r>
+              <a:rPr lang="en-US" dirty="0"/>
+              <a:t>Graduate Neumont University 2009, B.S. C.S. </a:t>
+            </a:r>
+          </a:p>
+          <a:p>
+            <a:pPr lvl="1"/>
+            <a:r>
+              <a:rPr lang="en-US" dirty="0" smtClean="0"/>
+              <a:t>Alumnus Microsoft </a:t>
+            </a:r>
+            <a:r>
+              <a:rPr lang="en-US" dirty="0"/>
+              <a:t>MVP in Windows Platform Development</a:t>
+            </a:r>
+          </a:p>
+          <a:p>
+            <a:pPr lvl="2"/>
+            <a:r>
+              <a:rPr lang="en-US" dirty="0" smtClean="0"/>
+              <a:t>Oct 2013 – Oct 2015</a:t>
+            </a:r>
+            <a:endParaRPr lang="en-US" dirty="0"/>
+          </a:p>
+          <a:p>
+            <a:pPr lvl="1"/>
+            <a:r>
+              <a:rPr lang="en-US" dirty="0"/>
+              <a:t>Former Nokia Champion</a:t>
+            </a:r>
+          </a:p>
+          <a:p>
+            <a:pPr lvl="1"/>
+            <a:r>
+              <a:rPr lang="en-US" dirty="0"/>
+              <a:t>Avid Mt. Biker and aspiring Rock Climber</a:t>
+            </a:r>
+          </a:p>
+          <a:p>
+            <a:endParaRPr lang="en-US" dirty="0"/>
+          </a:p>
+        </p:txBody>
+      </p:sp>
+    </p:spTree>
+    <p:extLst>
+      <p:ext uri="{BB962C8B-B14F-4D97-AF65-F5344CB8AC3E}">
+        <p14:creationId xmlns:p14="http://schemas.microsoft.com/office/powerpoint/2010/main" val="2540700765"/>
+      </p:ext>
+    </p:extLst>
+  </p:cSld>
+  <p:clrMapOvr>
+    <a:masterClrMapping/>
+  </p:clrMapOvr>
+  <p:timing>
+    <p:tnLst>
+      <p:par>
+        <p:cTn id="1" dur="indefinite" restart="never" nodeType="tmRoot"/>
+      </p:par>
+    </p:tnLst>
+  </p:timing>
+</p:sld>
+</file>
+
+<file path=ppt/slides/slide20.xml><?xml version="1.0" encoding="utf-8"?>
 <p:sld xmlns:a="http://schemas.openxmlformats.org/drawingml/2006/main" xmlns:r="http://schemas.openxmlformats.org/officeDocument/2006/relationships" xmlns:p="http://schemas.openxmlformats.org/presentationml/2006/main">
   <p:cSld>
     <p:spTree>
@@ -3557,7 +4716,7 @@
             </a:pPr>
             <a:r>
               <a:rPr lang="en-US" dirty="0" smtClean="0"/>
-              <a:t>Mention: SoCal Code Camp</a:t>
+              <a:t>Mention: Nerds Like You Meetup</a:t>
             </a:r>
           </a:p>
           <a:p>
@@ -3588,198 +4747,6 @@
     <p:extLst>
       <p:ext uri="{BB962C8B-B14F-4D97-AF65-F5344CB8AC3E}">
         <p14:creationId xmlns:p14="http://schemas.microsoft.com/office/powerpoint/2010/main" val="3205535264"/>
-      </p:ext>
-    </p:extLst>
-  </p:cSld>
-  <p:clrMapOvr>
-    <a:masterClrMapping/>
-  </p:clrMapOvr>
-  <p:timing>
-    <p:tnLst>
-      <p:par>
-        <p:cTn id="1" dur="indefinite" restart="never" nodeType="tmRoot"/>
-      </p:par>
-    </p:tnLst>
-  </p:timing>
-</p:sld>
-</file>
-
-<file path=ppt/slides/slide2.xml><?xml version="1.0" encoding="utf-8"?>
-<p:sld xmlns:a="http://schemas.openxmlformats.org/drawingml/2006/main" xmlns:r="http://schemas.openxmlformats.org/officeDocument/2006/relationships" xmlns:p="http://schemas.openxmlformats.org/presentationml/2006/main">
-  <p:cSld>
-    <p:spTree>
-      <p:nvGrpSpPr>
-        <p:cNvPr id="1" name=""/>
-        <p:cNvGrpSpPr/>
-        <p:nvPr/>
-      </p:nvGrpSpPr>
-      <p:grpSpPr>
-        <a:xfrm>
-          <a:off x="0" y="0"/>
-          <a:ext cx="0" cy="0"/>
-          <a:chOff x="0" y="0"/>
-          <a:chExt cx="0" cy="0"/>
-        </a:xfrm>
-      </p:grpSpPr>
-      <p:sp>
-        <p:nvSpPr>
-          <p:cNvPr id="2" name="Title 1"/>
-          <p:cNvSpPr>
-            <a:spLocks noGrp="1"/>
-          </p:cNvSpPr>
-          <p:nvPr>
-            <p:ph type="title"/>
-          </p:nvPr>
-        </p:nvSpPr>
-        <p:spPr/>
-        <p:txBody>
-          <a:bodyPr/>
-          <a:lstStyle/>
-          <a:p>
-            <a:r>
-              <a:rPr lang="en-US" dirty="0"/>
-              <a:t>About Danny &amp; InterKnowlogy</a:t>
-            </a:r>
-          </a:p>
-        </p:txBody>
-      </p:sp>
-      <p:sp>
-        <p:nvSpPr>
-          <p:cNvPr id="3" name="Content Placeholder 2"/>
-          <p:cNvSpPr>
-            <a:spLocks noGrp="1"/>
-          </p:cNvSpPr>
-          <p:nvPr>
-            <p:ph idx="1"/>
-          </p:nvPr>
-        </p:nvSpPr>
-        <p:spPr/>
-        <p:txBody>
-          <a:bodyPr>
-            <a:normAutofit fontScale="77500" lnSpcReduction="20000"/>
-          </a:bodyPr>
-          <a:lstStyle/>
-          <a:p>
-            <a:r>
-              <a:rPr lang="en-US" dirty="0"/>
-              <a:t>InterKnowlogy (</a:t>
-            </a:r>
-            <a:r>
-              <a:rPr lang="en-US" dirty="0">
-                <a:hlinkClick r:id="rId2"/>
-              </a:rPr>
-              <a:t>www.interknowlogy.com</a:t>
-            </a:r>
-            <a:r>
-              <a:rPr lang="en-US" dirty="0"/>
-              <a:t>)</a:t>
-            </a:r>
-          </a:p>
-          <a:p>
-            <a:pPr lvl="1"/>
-            <a:r>
-              <a:rPr lang="en-US" dirty="0"/>
-              <a:t>15 year old services firm – Custom Application Development</a:t>
-            </a:r>
-          </a:p>
-          <a:p>
-            <a:pPr lvl="1"/>
-            <a:r>
-              <a:rPr lang="en-US" dirty="0"/>
-              <a:t>Focused on building NUI solutions</a:t>
-            </a:r>
-          </a:p>
-          <a:p>
-            <a:pPr lvl="2"/>
-            <a:r>
-              <a:rPr lang="en-US" dirty="0"/>
-              <a:t>Universal Windows Platform </a:t>
-            </a:r>
-            <a:r>
-              <a:rPr lang="en-US" dirty="0" smtClean="0"/>
-              <a:t>(Desktop, Tablet, Phone), </a:t>
-            </a:r>
-            <a:r>
-              <a:rPr lang="en-US" dirty="0"/>
-              <a:t>Xamarin, WPF, Kinect, Azure</a:t>
-            </a:r>
-          </a:p>
-          <a:p>
-            <a:pPr lvl="2"/>
-            <a:r>
-              <a:rPr lang="en-US" dirty="0" smtClean="0"/>
-              <a:t>Touch, Gestures (Touchless), &amp; Mouse and Keyboard</a:t>
-            </a:r>
-          </a:p>
-          <a:p>
-            <a:pPr lvl="1"/>
-            <a:r>
-              <a:rPr lang="en-US" dirty="0" smtClean="0"/>
-              <a:t>Formal R&amp;D program: RECESS</a:t>
-            </a:r>
-          </a:p>
-          <a:p>
-            <a:pPr lvl="2"/>
-            <a:r>
-              <a:rPr lang="en-US" dirty="0" smtClean="0"/>
-              <a:t>Self </a:t>
-            </a:r>
-            <a:r>
-              <a:rPr lang="en-US" dirty="0"/>
-              <a:t>guided learning/My time to prepare this presentation</a:t>
-            </a:r>
-          </a:p>
-          <a:p>
-            <a:r>
-              <a:rPr lang="en-US" dirty="0"/>
-              <a:t>Danny Warren, Sr. Software Engineer</a:t>
-            </a:r>
-          </a:p>
-          <a:p>
-            <a:pPr lvl="1"/>
-            <a:r>
-              <a:rPr lang="en-US" dirty="0"/>
-              <a:t>Graduate Neumont University 2009, B.S. C.S. </a:t>
-            </a:r>
-          </a:p>
-          <a:p>
-            <a:pPr lvl="1"/>
-            <a:r>
-              <a:rPr lang="en-US" dirty="0"/>
-              <a:t>Microsoft MVP in Windows Platform Development</a:t>
-            </a:r>
-          </a:p>
-          <a:p>
-            <a:pPr lvl="2"/>
-            <a:r>
-              <a:rPr lang="en-US" dirty="0" smtClean="0"/>
-              <a:t>Oct 2013 – Oct 2015</a:t>
-            </a:r>
-            <a:endParaRPr lang="en-US" dirty="0"/>
-          </a:p>
-          <a:p>
-            <a:pPr lvl="1"/>
-            <a:r>
-              <a:rPr lang="en-US" dirty="0"/>
-              <a:t>Former Nokia Champion</a:t>
-            </a:r>
-          </a:p>
-          <a:p>
-            <a:pPr lvl="1"/>
-            <a:r>
-              <a:rPr lang="en-US" dirty="0"/>
-              <a:t>Avid Mt. Biker and aspiring Rock Climber</a:t>
-            </a:r>
-          </a:p>
-          <a:p>
-            <a:endParaRPr lang="en-US" dirty="0"/>
-          </a:p>
-        </p:txBody>
-      </p:sp>
-    </p:spTree>
-    <p:extLst>
-      <p:ext uri="{BB962C8B-B14F-4D97-AF65-F5344CB8AC3E}">
-        <p14:creationId xmlns:p14="http://schemas.microsoft.com/office/powerpoint/2010/main" val="2540700765"/>
       </p:ext>
     </p:extLst>
   </p:cSld>
@@ -3830,7 +4797,7 @@
           <a:p>
             <a:r>
               <a:rPr lang="en-US" dirty="0" smtClean="0"/>
-              <a:t>Materials</a:t>
+              <a:t>Agenda</a:t>
             </a:r>
             <a:endParaRPr lang="en-US" dirty="0"/>
           </a:p>
@@ -3848,197 +4815,50 @@
         </p:nvSpPr>
         <p:spPr/>
         <p:txBody>
-          <a:bodyPr>
-            <a:normAutofit fontScale="70000" lnSpcReduction="20000"/>
-          </a:bodyPr>
+          <a:bodyPr/>
           <a:lstStyle/>
           <a:p>
             <a:r>
-              <a:rPr lang="en-US" dirty="0"/>
-              <a:t>Xamarin Support Overview</a:t>
-            </a:r>
-          </a:p>
-          <a:p>
-            <a:pPr lvl="1"/>
-            <a:r>
-              <a:rPr lang="en-US" dirty="0">
-                <a:hlinkClick r:id="rId2"/>
-              </a:rPr>
-              <a:t>http://developer.xamarin.com/guides/cross-platform/fsharp/fsharp_support_overview/</a:t>
-            </a:r>
-            <a:endParaRPr lang="en-US" dirty="0"/>
-          </a:p>
-          <a:p>
-            <a:r>
-              <a:rPr lang="en-US" dirty="0"/>
-              <a:t>F# </a:t>
-            </a:r>
-            <a:r>
-              <a:rPr lang="en-US" dirty="0" err="1"/>
-              <a:t>Async</a:t>
-            </a:r>
-            <a:r>
-              <a:rPr lang="en-US" dirty="0"/>
-              <a:t> is a bit different than C# </a:t>
-            </a:r>
-            <a:r>
-              <a:rPr lang="en-US" dirty="0" err="1"/>
-              <a:t>Async</a:t>
-            </a:r>
-            <a:endParaRPr lang="en-US" dirty="0"/>
-          </a:p>
-          <a:p>
-            <a:pPr lvl="1"/>
-            <a:r>
-              <a:rPr lang="en-US" dirty="0">
-                <a:hlinkClick r:id="rId3"/>
-              </a:rPr>
-              <a:t>http://stackoverflow.com/questions/13063792/windows-store-apps-and-f</a:t>
-            </a:r>
-            <a:endParaRPr lang="en-US" dirty="0"/>
-          </a:p>
-          <a:p>
-            <a:pPr lvl="1"/>
-            <a:r>
-              <a:rPr lang="en-US" dirty="0">
-                <a:hlinkClick r:id="rId4"/>
-              </a:rPr>
-              <a:t>http://</a:t>
-            </a:r>
-            <a:r>
-              <a:rPr lang="en-US" dirty="0" smtClean="0">
-                <a:hlinkClick r:id="rId4"/>
-              </a:rPr>
-              <a:t>stackoverflow.com/questions/6811072/referencing-asynchronous-f-datatype-from-c-sharp</a:t>
-            </a:r>
-            <a:endParaRPr lang="en-US" dirty="0"/>
-          </a:p>
-          <a:p>
-            <a:r>
-              <a:rPr lang="en-US" dirty="0" smtClean="0"/>
-              <a:t>Always </a:t>
-            </a:r>
-            <a:r>
-              <a:rPr lang="en-US" dirty="0"/>
-              <a:t>5 Equation</a:t>
-            </a:r>
-          </a:p>
-          <a:p>
-            <a:pPr lvl="1"/>
-            <a:r>
-              <a:rPr lang="en-US" dirty="0">
-                <a:hlinkClick r:id="rId5"/>
-              </a:rPr>
-              <a:t>http://</a:t>
-            </a:r>
-            <a:r>
-              <a:rPr lang="en-US" dirty="0" smtClean="0">
-                <a:hlinkClick r:id="rId5"/>
-              </a:rPr>
-              <a:t>www.pedagonet.com/maths/always.htm</a:t>
-            </a:r>
-            <a:endParaRPr lang="en-US" dirty="0"/>
-          </a:p>
-          <a:p>
-            <a:r>
-              <a:rPr lang="en-US" dirty="0" smtClean="0"/>
-              <a:t>The Book of F#, By </a:t>
-            </a:r>
-            <a:r>
-              <a:rPr lang="en-US" dirty="0"/>
-              <a:t>Dave Fancher </a:t>
-            </a:r>
-            <a:r>
-              <a:rPr lang="en-US" dirty="0" smtClean="0"/>
-              <a:t>(</a:t>
-            </a:r>
-            <a:r>
-              <a:rPr lang="en-US" dirty="0" smtClean="0">
-                <a:hlinkClick r:id="rId6"/>
-              </a:rPr>
-              <a:t>https</a:t>
-            </a:r>
-            <a:r>
-              <a:rPr lang="en-US" dirty="0">
-                <a:hlinkClick r:id="rId6"/>
-              </a:rPr>
-              <a:t>://</a:t>
-            </a:r>
-            <a:r>
-              <a:rPr lang="en-US" dirty="0" smtClean="0">
-                <a:hlinkClick r:id="rId6"/>
-              </a:rPr>
-              <a:t>twitter.com/davefancher</a:t>
-            </a:r>
-            <a:r>
-              <a:rPr lang="en-US" dirty="0" smtClean="0"/>
-              <a:t>)</a:t>
-            </a:r>
-            <a:endParaRPr lang="en-US" dirty="0"/>
-          </a:p>
-          <a:p>
-            <a:r>
-              <a:rPr lang="en-US" dirty="0" smtClean="0"/>
-              <a:t>Gist about Discriminated Union</a:t>
-            </a:r>
-          </a:p>
-          <a:p>
-            <a:pPr lvl="1"/>
-            <a:r>
-              <a:rPr lang="en-US" dirty="0" smtClean="0">
-                <a:hlinkClick r:id="rId7"/>
-              </a:rPr>
-              <a:t>https</a:t>
-            </a:r>
-            <a:r>
-              <a:rPr lang="en-US" dirty="0">
-                <a:hlinkClick r:id="rId7"/>
-              </a:rPr>
-              <a:t>://</a:t>
-            </a:r>
-            <a:r>
-              <a:rPr lang="en-US" dirty="0" smtClean="0">
-                <a:hlinkClick r:id="rId7"/>
-              </a:rPr>
-              <a:t>gist.github.com/dannydwarren/cefb9d33a67b689bddf8</a:t>
-            </a:r>
-            <a:endParaRPr lang="en-US" dirty="0" smtClean="0"/>
-          </a:p>
-          <a:p>
-            <a:r>
-              <a:rPr lang="en-US" dirty="0" smtClean="0"/>
-              <a:t>Pipe |&gt; vs Function Composition &gt;&gt;</a:t>
-            </a:r>
-          </a:p>
-          <a:p>
-            <a:pPr lvl="1"/>
-            <a:r>
-              <a:rPr lang="en-US">
-                <a:hlinkClick r:id="rId8"/>
-              </a:rPr>
-              <a:t>http://fsharpforfunandprofit.com/posts/function-composition</a:t>
-            </a:r>
-            <a:r>
-              <a:rPr lang="en-US" smtClean="0">
-                <a:hlinkClick r:id="rId8"/>
-              </a:rPr>
-              <a:t>/</a:t>
-            </a:r>
-            <a:r>
-              <a:rPr lang="en-US" smtClean="0"/>
-              <a:t> </a:t>
-            </a:r>
-            <a:endParaRPr lang="en-US" dirty="0"/>
-          </a:p>
-          <a:p>
-            <a:endParaRPr lang="en-US" dirty="0"/>
+              <a:rPr lang="en-US" dirty="0" smtClean="0"/>
+              <a:t>What is F#</a:t>
+            </a:r>
+          </a:p>
+          <a:p>
+            <a:r>
+              <a:rPr lang="en-US" dirty="0" smtClean="0"/>
+              <a:t>Nature of C# vs F#</a:t>
+            </a:r>
+          </a:p>
+          <a:p>
+            <a:r>
+              <a:rPr lang="en-US" dirty="0" smtClean="0"/>
+              <a:t>What do you mean: “Classes of Bugs Don’t Exist”</a:t>
+            </a:r>
+          </a:p>
+          <a:p>
+            <a:r>
+              <a:rPr lang="en-US" dirty="0" smtClean="0"/>
+              <a:t>Language and Tooling Intro</a:t>
+            </a:r>
+          </a:p>
+          <a:p>
+            <a:r>
+              <a:rPr lang="en-US" dirty="0" smtClean="0"/>
+              <a:t>F# in Mobile (Using Xamarin)</a:t>
+            </a:r>
+          </a:p>
+          <a:p>
+            <a:r>
+              <a:rPr lang="en-US" dirty="0" smtClean="0"/>
+              <a:t>I can’t use F#, but how will it make me a better developer?</a:t>
+            </a:r>
           </a:p>
         </p:txBody>
       </p:sp>
     </p:spTree>
     <p:extLst>
       <p:ext uri="{BB962C8B-B14F-4D97-AF65-F5344CB8AC3E}">
-        <p14:creationId xmlns:p14="http://schemas.microsoft.com/office/powerpoint/2010/main" val="1803903495"/>
+        <p14:creationId xmlns:p14="http://schemas.microsoft.com/office/powerpoint/2010/main" val="1653991550"/>
       </p:ext>
     </p:extLst>
   </p:cSld>
@@ -4089,7 +4909,7 @@
           <a:p>
             <a:r>
               <a:rPr lang="en-US" dirty="0" smtClean="0"/>
-              <a:t>Agenda</a:t>
+              <a:t>What is F#</a:t>
             </a:r>
             <a:endParaRPr lang="en-US" dirty="0"/>
           </a:p>
@@ -4112,45 +4932,56 @@
           <a:p>
             <a:r>
               <a:rPr lang="en-US" dirty="0" smtClean="0"/>
-              <a:t>What is F#</a:t>
-            </a:r>
-          </a:p>
-          <a:p>
-            <a:r>
-              <a:rPr lang="en-US" dirty="0" smtClean="0"/>
-              <a:t>Nature of C# vs F#</a:t>
-            </a:r>
-          </a:p>
-          <a:p>
-            <a:r>
-              <a:rPr lang="en-US" dirty="0" smtClean="0"/>
-              <a:t>What do you mean: “Classes of Bugs Don’t Exist”</a:t>
-            </a:r>
-          </a:p>
-          <a:p>
-            <a:r>
-              <a:rPr lang="en-US" dirty="0" smtClean="0"/>
-              <a:t>Language and Tooling Intro</a:t>
-            </a:r>
-          </a:p>
-          <a:p>
-            <a:r>
-              <a:rPr lang="en-US" dirty="0" smtClean="0"/>
-              <a:t>F# in Mobile (Using Xamarin)</a:t>
-            </a:r>
-          </a:p>
-          <a:p>
-            <a:r>
-              <a:rPr lang="en-US" dirty="0" smtClean="0"/>
-              <a:t>I can’t use F#, but how will it make me a better developer?</a:t>
-            </a:r>
+              <a:t>F# is the 3</a:t>
+            </a:r>
+            <a:r>
+              <a:rPr lang="en-US" baseline="30000" dirty="0" smtClean="0"/>
+              <a:t>rd</a:t>
+            </a:r>
+            <a:r>
+              <a:rPr lang="en-US" dirty="0" smtClean="0"/>
+              <a:t> major .NET Language </a:t>
+            </a:r>
+          </a:p>
+          <a:p>
+            <a:pPr lvl="1"/>
+            <a:r>
+              <a:rPr lang="en-US" dirty="0" smtClean="0"/>
+              <a:t>Thanks CLI (Common Language Interface)</a:t>
+            </a:r>
+          </a:p>
+          <a:p>
+            <a:r>
+              <a:rPr lang="en-US" dirty="0" smtClean="0"/>
+              <a:t>Functional First, but is Multi-paradigm </a:t>
+            </a:r>
+          </a:p>
+          <a:p>
+            <a:pPr lvl="1"/>
+            <a:r>
+              <a:rPr lang="en-US" dirty="0" smtClean="0"/>
+              <a:t>Can also do OO</a:t>
+            </a:r>
+          </a:p>
+          <a:p>
+            <a:r>
+              <a:rPr lang="en-US" dirty="0" smtClean="0"/>
+              <a:t>NOT An Academic Language!</a:t>
+            </a:r>
+          </a:p>
+          <a:p>
+            <a:r>
+              <a:rPr lang="en-US" dirty="0" smtClean="0"/>
+              <a:t>Mature, but still FUN!</a:t>
+            </a:r>
+            <a:endParaRPr lang="en-US" dirty="0"/>
           </a:p>
         </p:txBody>
       </p:sp>
     </p:spTree>
     <p:extLst>
       <p:ext uri="{BB962C8B-B14F-4D97-AF65-F5344CB8AC3E}">
-        <p14:creationId xmlns:p14="http://schemas.microsoft.com/office/powerpoint/2010/main" val="1653991550"/>
+        <p14:creationId xmlns:p14="http://schemas.microsoft.com/office/powerpoint/2010/main" val="2973290758"/>
       </p:ext>
     </p:extLst>
   </p:cSld>
@@ -4201,7 +5032,7 @@
           <a:p>
             <a:r>
               <a:rPr lang="en-US" dirty="0" smtClean="0"/>
-              <a:t>What is F#</a:t>
+              <a:t>Nature vs Nurture</a:t>
             </a:r>
             <a:endParaRPr lang="en-US" dirty="0"/>
           </a:p>
@@ -4209,12 +5040,12 @@
       </p:sp>
       <p:sp>
         <p:nvSpPr>
-          <p:cNvPr id="3" name="Content Placeholder 2"/>
+          <p:cNvPr id="6" name="Text Placeholder 5"/>
           <p:cNvSpPr>
             <a:spLocks noGrp="1"/>
           </p:cNvSpPr>
           <p:nvPr>
-            <p:ph idx="1"/>
+            <p:ph type="body" idx="1"/>
           </p:nvPr>
         </p:nvSpPr>
         <p:spPr/>
@@ -4224,47 +5055,164 @@
           <a:p>
             <a:r>
               <a:rPr lang="en-US" dirty="0" smtClean="0"/>
-              <a:t>F# is the 3</a:t>
-            </a:r>
-            <a:r>
-              <a:rPr lang="en-US" baseline="30000" dirty="0" smtClean="0"/>
-              <a:t>rd</a:t>
-            </a:r>
-            <a:r>
-              <a:rPr lang="en-US" dirty="0" smtClean="0"/>
-              <a:t> major .NET Language </a:t>
-            </a:r>
-          </a:p>
-          <a:p>
-            <a:pPr lvl="1"/>
-            <a:r>
-              <a:rPr lang="en-US" dirty="0" smtClean="0"/>
-              <a:t>Thanks CLI (Common Language Interface)</a:t>
-            </a:r>
-          </a:p>
-          <a:p>
-            <a:r>
-              <a:rPr lang="en-US" dirty="0" smtClean="0"/>
-              <a:t>Functional First, but is Multi-paradigm </a:t>
-            </a:r>
-          </a:p>
-          <a:p>
-            <a:pPr lvl="1"/>
-            <a:r>
-              <a:rPr lang="en-US" dirty="0" smtClean="0"/>
-              <a:t>Can also do OO</a:t>
-            </a:r>
-          </a:p>
-          <a:p>
-            <a:r>
-              <a:rPr lang="en-US" dirty="0" smtClean="0"/>
-              <a:t>NOT An Academic Language!</a:t>
-            </a:r>
-          </a:p>
-          <a:p>
-            <a:r>
-              <a:rPr lang="en-US" dirty="0" smtClean="0"/>
-              <a:t>Mature, but still FUN!</a:t>
+              <a:t>C#</a:t>
+            </a:r>
+            <a:endParaRPr lang="en-US" dirty="0"/>
+          </a:p>
+        </p:txBody>
+      </p:sp>
+      <p:sp>
+        <p:nvSpPr>
+          <p:cNvPr id="7" name="Content Placeholder 6"/>
+          <p:cNvSpPr>
+            <a:spLocks noGrp="1"/>
+          </p:cNvSpPr>
+          <p:nvPr>
+            <p:ph sz="half" idx="2"/>
+          </p:nvPr>
+        </p:nvSpPr>
+        <p:spPr/>
+        <p:txBody>
+          <a:bodyPr/>
+          <a:lstStyle/>
+          <a:p>
+            <a:r>
+              <a:rPr lang="en-US" dirty="0" smtClean="0"/>
+              <a:t>OO</a:t>
+            </a:r>
+          </a:p>
+          <a:p>
+            <a:r>
+              <a:rPr lang="en-US" dirty="0" smtClean="0"/>
+              <a:t>Mutable</a:t>
+            </a:r>
+          </a:p>
+          <a:p>
+            <a:r>
+              <a:rPr lang="en-US" dirty="0" smtClean="0"/>
+              <a:t>Rigid Type System</a:t>
+            </a:r>
+          </a:p>
+          <a:p>
+            <a:r>
+              <a:rPr lang="en-US" dirty="0" smtClean="0"/>
+              <a:t>Insignificant Whitespace</a:t>
+            </a:r>
+          </a:p>
+          <a:p>
+            <a:pPr lvl="1"/>
+            <a:r>
+              <a:rPr lang="en-US" dirty="0" smtClean="0"/>
+              <a:t>Explicit Blocks of Code</a:t>
+            </a:r>
+          </a:p>
+          <a:p>
+            <a:r>
+              <a:rPr lang="en-US" dirty="0" smtClean="0"/>
+              <a:t>NULL is Significant</a:t>
+            </a:r>
+          </a:p>
+          <a:p>
+            <a:r>
+              <a:rPr lang="en-US" dirty="0" smtClean="0"/>
+              <a:t>Functions not First Class</a:t>
+            </a:r>
+          </a:p>
+          <a:p>
+            <a:pPr lvl="1"/>
+            <a:r>
+              <a:rPr lang="en-US" dirty="0" smtClean="0"/>
+              <a:t>Can use Delegate</a:t>
+            </a:r>
+            <a:endParaRPr lang="en-US" dirty="0"/>
+          </a:p>
+        </p:txBody>
+      </p:sp>
+      <p:sp>
+        <p:nvSpPr>
+          <p:cNvPr id="8" name="Text Placeholder 7"/>
+          <p:cNvSpPr>
+            <a:spLocks noGrp="1"/>
+          </p:cNvSpPr>
+          <p:nvPr>
+            <p:ph type="body" sz="quarter" idx="3"/>
+          </p:nvPr>
+        </p:nvSpPr>
+        <p:spPr/>
+        <p:txBody>
+          <a:bodyPr/>
+          <a:lstStyle/>
+          <a:p>
+            <a:r>
+              <a:rPr lang="en-US" dirty="0" smtClean="0"/>
+              <a:t>F#</a:t>
+            </a:r>
+            <a:endParaRPr lang="en-US" dirty="0"/>
+          </a:p>
+        </p:txBody>
+      </p:sp>
+      <p:sp>
+        <p:nvSpPr>
+          <p:cNvPr id="9" name="Content Placeholder 8"/>
+          <p:cNvSpPr>
+            <a:spLocks noGrp="1"/>
+          </p:cNvSpPr>
+          <p:nvPr>
+            <p:ph sz="quarter" idx="4"/>
+          </p:nvPr>
+        </p:nvSpPr>
+        <p:spPr/>
+        <p:txBody>
+          <a:bodyPr/>
+          <a:lstStyle/>
+          <a:p>
+            <a:r>
+              <a:rPr lang="en-US" dirty="0" smtClean="0"/>
+              <a:t>Functional</a:t>
+            </a:r>
+          </a:p>
+          <a:p>
+            <a:r>
+              <a:rPr lang="en-US" dirty="0" smtClean="0"/>
+              <a:t>Immutable</a:t>
+            </a:r>
+          </a:p>
+          <a:p>
+            <a:r>
+              <a:rPr lang="en-US" dirty="0" smtClean="0"/>
+              <a:t>Flexible Type System (Major Benefit)</a:t>
+            </a:r>
+          </a:p>
+          <a:p>
+            <a:r>
+              <a:rPr lang="en-US" dirty="0" smtClean="0"/>
+              <a:t>Significant Whitespace</a:t>
+            </a:r>
+          </a:p>
+          <a:p>
+            <a:pPr lvl="1"/>
+            <a:r>
+              <a:rPr lang="en-US" dirty="0" smtClean="0"/>
+              <a:t>Implicit Blocks of Code</a:t>
+            </a:r>
+          </a:p>
+          <a:p>
+            <a:r>
+              <a:rPr lang="en-US" dirty="0" smtClean="0"/>
+              <a:t>NULL is Avoided, but still exists</a:t>
+            </a:r>
+          </a:p>
+          <a:p>
+            <a:r>
+              <a:rPr lang="en-US" dirty="0" smtClean="0"/>
+              <a:t>Function is First Class</a:t>
+            </a:r>
+          </a:p>
+          <a:p>
+            <a:pPr lvl="1"/>
+            <a:r>
+              <a:rPr lang="en-US" dirty="0" smtClean="0"/>
+              <a:t>Can be treated as an object</a:t>
             </a:r>
             <a:endParaRPr lang="en-US" dirty="0"/>
           </a:p>
@@ -4273,7 +5221,7 @@
     </p:spTree>
     <p:extLst>
       <p:ext uri="{BB962C8B-B14F-4D97-AF65-F5344CB8AC3E}">
-        <p14:creationId xmlns:p14="http://schemas.microsoft.com/office/powerpoint/2010/main" val="2973290758"/>
+        <p14:creationId xmlns:p14="http://schemas.microsoft.com/office/powerpoint/2010/main" val="4072921631"/>
       </p:ext>
     </p:extLst>
   </p:cSld>
@@ -4324,7 +5272,7 @@
           <a:p>
             <a:r>
               <a:rPr lang="en-US" dirty="0" smtClean="0"/>
-              <a:t>Nature vs Nurture</a:t>
+              <a:t>That Bug CAN’T Exist Here!</a:t>
             </a:r>
             <a:endParaRPr lang="en-US" dirty="0"/>
           </a:p>
@@ -4332,179 +5280,174 @@
       </p:sp>
       <p:sp>
         <p:nvSpPr>
-          <p:cNvPr id="6" name="Text Placeholder 5"/>
+          <p:cNvPr id="3" name="Content Placeholder 2"/>
           <p:cNvSpPr>
             <a:spLocks noGrp="1"/>
           </p:cNvSpPr>
           <p:nvPr>
-            <p:ph type="body" idx="1"/>
+            <p:ph idx="1"/>
           </p:nvPr>
         </p:nvSpPr>
         <p:spPr/>
         <p:txBody>
-          <a:bodyPr/>
+          <a:bodyPr>
+            <a:normAutofit fontScale="70000" lnSpcReduction="20000"/>
+          </a:bodyPr>
           <a:lstStyle/>
           <a:p>
             <a:r>
               <a:rPr lang="en-US" dirty="0" smtClean="0"/>
-              <a:t>C#</a:t>
-            </a:r>
-            <a:endParaRPr lang="en-US" dirty="0"/>
-          </a:p>
-        </p:txBody>
-      </p:sp>
-      <p:sp>
-        <p:nvSpPr>
-          <p:cNvPr id="7" name="Content Placeholder 6"/>
-          <p:cNvSpPr>
-            <a:spLocks noGrp="1"/>
-          </p:cNvSpPr>
-          <p:nvPr>
-            <p:ph sz="half" idx="2"/>
-          </p:nvPr>
-        </p:nvSpPr>
-        <p:spPr/>
-        <p:txBody>
-          <a:bodyPr/>
-          <a:lstStyle/>
-          <a:p>
-            <a:r>
-              <a:rPr lang="en-US" dirty="0" smtClean="0"/>
-              <a:t>OO</a:t>
-            </a:r>
-          </a:p>
-          <a:p>
-            <a:r>
-              <a:rPr lang="en-US" dirty="0" smtClean="0"/>
-              <a:t>Mutable</a:t>
-            </a:r>
-          </a:p>
-          <a:p>
-            <a:r>
-              <a:rPr lang="en-US" dirty="0" smtClean="0"/>
-              <a:t>Rigid Type System</a:t>
-            </a:r>
-          </a:p>
-          <a:p>
-            <a:r>
-              <a:rPr lang="en-US" dirty="0" smtClean="0"/>
-              <a:t>Insignificant Whitespace</a:t>
-            </a:r>
-          </a:p>
-          <a:p>
-            <a:pPr lvl="1"/>
-            <a:r>
-              <a:rPr lang="en-US" dirty="0" smtClean="0"/>
-              <a:t>Explicit Blocks of Code</a:t>
-            </a:r>
-          </a:p>
-          <a:p>
-            <a:r>
-              <a:rPr lang="en-US" dirty="0" smtClean="0"/>
-              <a:t>NULL is Significant</a:t>
-            </a:r>
-          </a:p>
-          <a:p>
-            <a:r>
-              <a:rPr lang="en-US" dirty="0" smtClean="0"/>
-              <a:t>Functions not First Class</a:t>
-            </a:r>
-          </a:p>
-          <a:p>
-            <a:pPr lvl="1"/>
-            <a:r>
-              <a:rPr lang="en-US" dirty="0" smtClean="0"/>
-              <a:t>Can use Delegate</a:t>
-            </a:r>
-            <a:endParaRPr lang="en-US" dirty="0"/>
-          </a:p>
-        </p:txBody>
-      </p:sp>
-      <p:sp>
-        <p:nvSpPr>
-          <p:cNvPr id="8" name="Text Placeholder 7"/>
-          <p:cNvSpPr>
-            <a:spLocks noGrp="1"/>
-          </p:cNvSpPr>
-          <p:nvPr>
-            <p:ph type="body" sz="quarter" idx="3"/>
-          </p:nvPr>
-        </p:nvSpPr>
-        <p:spPr/>
-        <p:txBody>
-          <a:bodyPr/>
-          <a:lstStyle/>
-          <a:p>
-            <a:r>
-              <a:rPr lang="en-US" dirty="0" smtClean="0"/>
-              <a:t>F#</a:t>
-            </a:r>
-            <a:endParaRPr lang="en-US" dirty="0"/>
-          </a:p>
-        </p:txBody>
-      </p:sp>
-      <p:sp>
-        <p:nvSpPr>
-          <p:cNvPr id="9" name="Content Placeholder 8"/>
-          <p:cNvSpPr>
-            <a:spLocks noGrp="1"/>
-          </p:cNvSpPr>
-          <p:nvPr>
-            <p:ph sz="quarter" idx="4"/>
-          </p:nvPr>
-        </p:nvSpPr>
-        <p:spPr/>
-        <p:txBody>
-          <a:bodyPr/>
-          <a:lstStyle/>
-          <a:p>
-            <a:r>
-              <a:rPr lang="en-US" dirty="0" smtClean="0"/>
-              <a:t>Functional</a:t>
-            </a:r>
-          </a:p>
-          <a:p>
-            <a:r>
-              <a:rPr lang="en-US" dirty="0" smtClean="0"/>
-              <a:t>Immutable</a:t>
-            </a:r>
-          </a:p>
-          <a:p>
-            <a:r>
-              <a:rPr lang="en-US" dirty="0" smtClean="0"/>
-              <a:t>Flexible Type System (Major Benefit)</a:t>
-            </a:r>
-          </a:p>
-          <a:p>
-            <a:r>
-              <a:rPr lang="en-US" dirty="0" smtClean="0"/>
-              <a:t>Significant Whitespace</a:t>
-            </a:r>
-          </a:p>
-          <a:p>
-            <a:pPr lvl="1"/>
-            <a:r>
-              <a:rPr lang="en-US" dirty="0" smtClean="0"/>
-              <a:t>Implicit Blocks of Code</a:t>
-            </a:r>
-          </a:p>
-          <a:p>
-            <a:r>
-              <a:rPr lang="en-US" dirty="0" smtClean="0"/>
-              <a:t>NULL is Avoided, but still exists</a:t>
-            </a:r>
-          </a:p>
-          <a:p>
-            <a:r>
-              <a:rPr lang="en-US" dirty="0" smtClean="0"/>
-              <a:t>Function is First Class</a:t>
-            </a:r>
-          </a:p>
-          <a:p>
-            <a:pPr lvl="1"/>
-            <a:r>
-              <a:rPr lang="en-US" dirty="0" smtClean="0"/>
-              <a:t>Can be treated as an object</a:t>
+              <a:t>Immutability by default</a:t>
+            </a:r>
+          </a:p>
+          <a:p>
+            <a:pPr lvl="1"/>
+            <a:r>
+              <a:rPr lang="en-US" dirty="0" smtClean="0"/>
+              <a:t>Forces us away from </a:t>
+            </a:r>
+            <a:r>
+              <a:rPr lang="en-US" dirty="0" err="1" smtClean="0"/>
+              <a:t>stateful</a:t>
+            </a:r>
+            <a:r>
+              <a:rPr lang="en-US" dirty="0" smtClean="0"/>
+              <a:t> bugs</a:t>
+            </a:r>
+          </a:p>
+          <a:p>
+            <a:pPr lvl="1"/>
+            <a:r>
+              <a:rPr lang="en-US" dirty="0" smtClean="0"/>
+              <a:t>In order to make something mutable you must be explicit</a:t>
+            </a:r>
+          </a:p>
+          <a:p>
+            <a:pPr lvl="2"/>
+            <a:r>
+              <a:rPr lang="en-US" dirty="0" smtClean="0"/>
+              <a:t>So in theory the developer thought this through… Yeah right! ;-)</a:t>
+            </a:r>
+          </a:p>
+          <a:p>
+            <a:pPr lvl="1"/>
+            <a:r>
+              <a:rPr lang="en-US" dirty="0"/>
+              <a:t>Online Sample: </a:t>
+            </a:r>
+            <a:r>
+              <a:rPr lang="en-US" dirty="0">
+                <a:hlinkClick r:id="rId2"/>
+              </a:rPr>
+              <a:t>http://fsharpforfunandprofit.com/posts/correctness-immutability</a:t>
+            </a:r>
+            <a:r>
+              <a:rPr lang="en-US" dirty="0" smtClean="0">
+                <a:hlinkClick r:id="rId2"/>
+              </a:rPr>
+              <a:t>/</a:t>
+            </a:r>
+            <a:r>
+              <a:rPr lang="en-US" dirty="0" smtClean="0"/>
+              <a:t> </a:t>
+            </a:r>
+          </a:p>
+          <a:p>
+            <a:r>
+              <a:rPr lang="en-US" dirty="0" smtClean="0"/>
+              <a:t>Flexible Type System</a:t>
+            </a:r>
+          </a:p>
+          <a:p>
+            <a:pPr lvl="1"/>
+            <a:r>
+              <a:rPr lang="en-US" dirty="0" smtClean="0"/>
+              <a:t>Can force compile time validation.</a:t>
+            </a:r>
+          </a:p>
+          <a:p>
+            <a:pPr lvl="1"/>
+            <a:r>
+              <a:rPr lang="en-US" dirty="0"/>
+              <a:t>Online Sample: </a:t>
+            </a:r>
+            <a:r>
+              <a:rPr lang="en-US" dirty="0">
+                <a:hlinkClick r:id="rId3"/>
+              </a:rPr>
+              <a:t>http://fsharpforfunandprofit.com/posts/designing-for-correctness</a:t>
+            </a:r>
+            <a:r>
+              <a:rPr lang="en-US" dirty="0" smtClean="0">
+                <a:hlinkClick r:id="rId3"/>
+              </a:rPr>
+              <a:t>/</a:t>
+            </a:r>
+            <a:r>
+              <a:rPr lang="en-US" dirty="0" smtClean="0"/>
+              <a:t> </a:t>
+            </a:r>
+          </a:p>
+          <a:p>
+            <a:pPr lvl="1"/>
+            <a:r>
+              <a:rPr lang="en-US" dirty="0" smtClean="0"/>
+              <a:t>Example in Demo Code</a:t>
+            </a:r>
+          </a:p>
+          <a:p>
+            <a:r>
+              <a:rPr lang="en-US" dirty="0" smtClean="0"/>
+              <a:t>NULL avoided</a:t>
+            </a:r>
+          </a:p>
+          <a:p>
+            <a:pPr lvl="1"/>
+            <a:r>
+              <a:rPr lang="en-US" dirty="0" smtClean="0"/>
+              <a:t>Forces developers to think through all code paths</a:t>
+            </a:r>
+          </a:p>
+          <a:p>
+            <a:pPr lvl="2"/>
+            <a:r>
+              <a:rPr lang="en-US" dirty="0" smtClean="0"/>
+              <a:t>Avoids many unnecessary </a:t>
+            </a:r>
+            <a:r>
+              <a:rPr lang="en-US" dirty="0" err="1" smtClean="0"/>
+              <a:t>NullReferenceExceptions</a:t>
+            </a:r>
+            <a:r>
+              <a:rPr lang="en-US" dirty="0" smtClean="0"/>
+              <a:t>!</a:t>
+            </a:r>
+          </a:p>
+          <a:p>
+            <a:pPr lvl="1"/>
+            <a:r>
+              <a:rPr lang="en-US" dirty="0" smtClean="0"/>
+              <a:t>Online Sample</a:t>
+            </a:r>
+            <a:r>
+              <a:rPr lang="en-US" dirty="0"/>
+              <a:t>: </a:t>
+            </a:r>
+            <a:r>
+              <a:rPr lang="en-US" dirty="0">
+                <a:hlinkClick r:id="rId4"/>
+              </a:rPr>
+              <a:t>http://fsharpforfunandprofit.com/posts/the-option-type/#</a:t>
+            </a:r>
+            <a:r>
+              <a:rPr lang="en-US" dirty="0" smtClean="0">
+                <a:hlinkClick r:id="rId4"/>
+              </a:rPr>
+              <a:t>option-is-not-null</a:t>
+            </a:r>
+            <a:r>
+              <a:rPr lang="en-US" dirty="0" smtClean="0"/>
+              <a:t> </a:t>
             </a:r>
             <a:endParaRPr lang="en-US" dirty="0"/>
           </a:p>
@@ -4513,7 +5456,7 @@
     </p:spTree>
     <p:extLst>
       <p:ext uri="{BB962C8B-B14F-4D97-AF65-F5344CB8AC3E}">
-        <p14:creationId xmlns:p14="http://schemas.microsoft.com/office/powerpoint/2010/main" val="4072921631"/>
+        <p14:creationId xmlns:p14="http://schemas.microsoft.com/office/powerpoint/2010/main" val="2148005894"/>
       </p:ext>
     </p:extLst>
   </p:cSld>
@@ -4559,12 +5502,22 @@
         </p:nvSpPr>
         <p:spPr/>
         <p:txBody>
-          <a:bodyPr/>
+          <a:bodyPr>
+            <a:normAutofit/>
+          </a:bodyPr>
           <a:lstStyle/>
           <a:p>
             <a:r>
               <a:rPr lang="en-US" dirty="0" smtClean="0"/>
-              <a:t>That Bug CAN’T Exist Here!</a:t>
+              <a:t>Hai! I’m F#! And dis </a:t>
+            </a:r>
+            <a:r>
+              <a:rPr lang="en-US" dirty="0" err="1" smtClean="0"/>
+              <a:t>mai</a:t>
+            </a:r>
+            <a:r>
+              <a:rPr lang="en-US" dirty="0" smtClean="0"/>
+              <a:t> friend REPL…</a:t>
             </a:r>
             <a:endParaRPr lang="en-US" dirty="0"/>
           </a:p>
@@ -4583,164 +5536,161 @@
         <p:spPr/>
         <p:txBody>
           <a:bodyPr>
-            <a:normAutofit fontScale="70000" lnSpcReduction="20000"/>
+            <a:normAutofit fontScale="85000" lnSpcReduction="20000"/>
           </a:bodyPr>
           <a:lstStyle/>
           <a:p>
             <a:r>
               <a:rPr lang="en-US" dirty="0" smtClean="0"/>
-              <a:t>Immutability by default</a:t>
-            </a:r>
-          </a:p>
-          <a:p>
-            <a:pPr lvl="1"/>
-            <a:r>
-              <a:rPr lang="en-US" dirty="0" smtClean="0"/>
-              <a:t>Forces us away from </a:t>
-            </a:r>
-            <a:r>
-              <a:rPr lang="en-US" dirty="0" err="1" smtClean="0"/>
-              <a:t>stateful</a:t>
-            </a:r>
-            <a:r>
-              <a:rPr lang="en-US" dirty="0" smtClean="0"/>
-              <a:t> bugs</a:t>
-            </a:r>
-          </a:p>
-          <a:p>
-            <a:pPr lvl="1"/>
-            <a:r>
-              <a:rPr lang="en-US" dirty="0" smtClean="0"/>
-              <a:t>In order to make something mutable you must be explicit</a:t>
-            </a:r>
-          </a:p>
-          <a:p>
-            <a:pPr lvl="2"/>
-            <a:r>
-              <a:rPr lang="en-US" dirty="0" smtClean="0"/>
-              <a:t>So in theory the developer thought this through… Yeah right! ;-)</a:t>
-            </a:r>
-          </a:p>
-          <a:p>
-            <a:pPr lvl="1"/>
-            <a:r>
-              <a:rPr lang="en-US" dirty="0"/>
-              <a:t>Online Sample: </a:t>
+              <a:t>Language Intro: </a:t>
+            </a:r>
+          </a:p>
+          <a:p>
+            <a:pPr lvl="1"/>
+            <a:r>
+              <a:rPr lang="en-US" dirty="0" smtClean="0"/>
+              <a:t>Start Here: </a:t>
+            </a:r>
+            <a:r>
+              <a:rPr lang="en-US" dirty="0" smtClean="0">
+                <a:hlinkClick r:id="rId2"/>
+              </a:rPr>
+              <a:t>http</a:t>
             </a:r>
             <a:r>
               <a:rPr lang="en-US" dirty="0">
                 <a:hlinkClick r:id="rId2"/>
               </a:rPr>
-              <a:t>http://fsharpforfunandprofit.com/posts/correctness-immutability</a:t>
+              <a:t>://fsharp.org/about/learning.html</a:t>
+            </a:r>
+            <a:endParaRPr lang="en-US" dirty="0"/>
+          </a:p>
+          <a:p>
+            <a:pPr lvl="1"/>
+            <a:r>
+              <a:rPr lang="en-US" dirty="0" smtClean="0"/>
+              <a:t>Syntax Guide: </a:t>
             </a:r>
             <a:r>
               <a:rPr lang="en-US" dirty="0" smtClean="0">
-                <a:hlinkClick r:id="rId2"/>
+                <a:hlinkClick r:id="rId3"/>
               </a:rPr>
-              <a:t>/</a:t>
-            </a:r>
-            <a:r>
-              <a:rPr lang="en-US" dirty="0" smtClean="0"/>
-              <a:t> </a:t>
-            </a:r>
-          </a:p>
-          <a:p>
-            <a:r>
-              <a:rPr lang="en-US" dirty="0" smtClean="0"/>
-              <a:t>Flexible Type System</a:t>
-            </a:r>
-          </a:p>
-          <a:p>
-            <a:pPr lvl="1"/>
-            <a:r>
-              <a:rPr lang="en-US" dirty="0" smtClean="0"/>
-              <a:t>Can force compile time validation.</a:t>
-            </a:r>
-          </a:p>
-          <a:p>
-            <a:pPr lvl="1"/>
-            <a:r>
-              <a:rPr lang="en-US" dirty="0"/>
-              <a:t>Online Sample: </a:t>
+              <a:t>http</a:t>
             </a:r>
             <a:r>
               <a:rPr lang="en-US" dirty="0">
                 <a:hlinkClick r:id="rId3"/>
               </a:rPr>
-              <a:t>http://fsharpforfunandprofit.com/posts/designing-for-correctness</a:t>
+              <a:t>://dungpa.github.io/fsharp-cheatsheet/</a:t>
+            </a:r>
+            <a:endParaRPr lang="en-US" dirty="0"/>
+          </a:p>
+          <a:p>
+            <a:pPr lvl="1"/>
+            <a:r>
+              <a:rPr lang="en-US" dirty="0" smtClean="0"/>
+              <a:t>Why? Here’s Why!: </a:t>
             </a:r>
             <a:r>
               <a:rPr lang="en-US" dirty="0" smtClean="0">
-                <a:hlinkClick r:id="rId3"/>
+                <a:hlinkClick r:id="rId4"/>
               </a:rPr>
-              <a:t>/</a:t>
-            </a:r>
-            <a:r>
-              <a:rPr lang="en-US" dirty="0" smtClean="0"/>
-              <a:t> </a:t>
-            </a:r>
-          </a:p>
-          <a:p>
-            <a:pPr lvl="1"/>
-            <a:r>
-              <a:rPr lang="en-US" dirty="0" smtClean="0"/>
-              <a:t>Example in Demo Code</a:t>
-            </a:r>
-          </a:p>
-          <a:p>
-            <a:r>
-              <a:rPr lang="en-US" dirty="0" smtClean="0"/>
-              <a:t>NULL avoided</a:t>
-            </a:r>
-          </a:p>
-          <a:p>
-            <a:pPr lvl="1"/>
-            <a:r>
-              <a:rPr lang="en-US" dirty="0" smtClean="0"/>
-              <a:t>Forces developers to think through all code paths</a:t>
-            </a:r>
-          </a:p>
-          <a:p>
-            <a:pPr lvl="2"/>
-            <a:r>
-              <a:rPr lang="en-US" dirty="0" smtClean="0"/>
-              <a:t>Avoids many unnecessary </a:t>
-            </a:r>
-            <a:r>
-              <a:rPr lang="en-US" dirty="0" err="1" smtClean="0"/>
-              <a:t>NullReferenceExceptions</a:t>
-            </a:r>
-            <a:r>
-              <a:rPr lang="en-US" dirty="0" smtClean="0"/>
-              <a:t>!</a:t>
-            </a:r>
-          </a:p>
-          <a:p>
-            <a:pPr lvl="1"/>
-            <a:r>
-              <a:rPr lang="en-US" dirty="0" smtClean="0"/>
-              <a:t>Online Sample</a:t>
-            </a:r>
-            <a:r>
-              <a:rPr lang="en-US" dirty="0"/>
-              <a:t>: </a:t>
+              <a:t>http</a:t>
             </a:r>
             <a:r>
               <a:rPr lang="en-US" dirty="0">
                 <a:hlinkClick r:id="rId4"/>
               </a:rPr>
-              <a:t>http://fsharpforfunandprofit.com/posts/the-option-type/#</a:t>
+              <a:t>://fsharpforfunandprofit.com/why-use-fsharp/</a:t>
+            </a:r>
+            <a:endParaRPr lang="en-US" dirty="0"/>
+          </a:p>
+          <a:p>
+            <a:pPr lvl="1"/>
+            <a:r>
+              <a:rPr lang="en-US" dirty="0" smtClean="0"/>
+              <a:t>My personal favorite intro session: </a:t>
             </a:r>
             <a:r>
               <a:rPr lang="en-US" dirty="0" smtClean="0">
-                <a:hlinkClick r:id="rId4"/>
+                <a:hlinkClick r:id="rId5"/>
               </a:rPr>
-              <a:t>option-is-not-null</a:t>
-            </a:r>
-            <a:r>
-              <a:rPr lang="en-US" dirty="0" smtClean="0"/>
-              <a:t> </a:t>
-            </a:r>
+              <a:t>https</a:t>
+            </a:r>
+            <a:r>
+              <a:rPr lang="en-US" dirty="0">
+                <a:hlinkClick r:id="rId5"/>
+              </a:rPr>
+              <a:t>://skillsmatter.com/skillscasts/4971-domain-driven-design-with-scott-wlaschin</a:t>
+            </a:r>
+            <a:endParaRPr lang="en-US" dirty="0"/>
+          </a:p>
+          <a:p>
+            <a:pPr lvl="1"/>
+            <a:r>
+              <a:rPr lang="en-US" dirty="0" err="1" smtClean="0"/>
+              <a:t>FSharpForFunAndProfit</a:t>
+            </a:r>
+            <a:r>
+              <a:rPr lang="en-US" dirty="0" smtClean="0"/>
+              <a:t>: </a:t>
+            </a:r>
+            <a:r>
+              <a:rPr lang="en-US" dirty="0" smtClean="0">
+                <a:hlinkClick r:id="rId6"/>
+              </a:rPr>
+              <a:t>http</a:t>
+            </a:r>
+            <a:r>
+              <a:rPr lang="en-US" dirty="0">
+                <a:hlinkClick r:id="rId6"/>
+              </a:rPr>
+              <a:t>://fsharpforfunandprofit.com/site-contents/</a:t>
+            </a:r>
+            <a:endParaRPr lang="en-US" dirty="0"/>
+          </a:p>
+          <a:p>
+            <a:pPr lvl="1"/>
+            <a:r>
+              <a:rPr lang="en-US" dirty="0" smtClean="0"/>
+              <a:t>More Why!: </a:t>
+            </a:r>
+            <a:r>
+              <a:rPr lang="en-US" dirty="0" smtClean="0">
+                <a:hlinkClick r:id="rId7"/>
+              </a:rPr>
+              <a:t>http</a:t>
+            </a:r>
+            <a:r>
+              <a:rPr lang="en-US" dirty="0">
+                <a:hlinkClick r:id="rId7"/>
+              </a:rPr>
+              <a:t>://fsharpforfunandprofit.com/series/why-use-fsharp.html</a:t>
+            </a:r>
+            <a:endParaRPr lang="en-US" dirty="0"/>
+          </a:p>
+          <a:p>
+            <a:r>
+              <a:rPr lang="en-US" dirty="0" smtClean="0"/>
+              <a:t>Tooling Intro:</a:t>
+            </a:r>
+          </a:p>
+          <a:p>
+            <a:pPr lvl="1"/>
+            <a:r>
+              <a:rPr lang="en-US" dirty="0" smtClean="0"/>
+              <a:t>F# Interactive (REPL)</a:t>
+            </a:r>
+          </a:p>
+          <a:p>
+            <a:pPr lvl="1"/>
+            <a:r>
+              <a:rPr lang="en-US" dirty="0" smtClean="0"/>
+              <a:t>VS Debugging works just like it does in C#</a:t>
+            </a:r>
+          </a:p>
+          <a:p>
+            <a:pPr lvl="1"/>
             <a:endParaRPr lang="en-US" dirty="0"/>
           </a:p>
         </p:txBody>
@@ -4748,7 +5698,7 @@
     </p:spTree>
     <p:extLst>
       <p:ext uri="{BB962C8B-B14F-4D97-AF65-F5344CB8AC3E}">
-        <p14:creationId xmlns:p14="http://schemas.microsoft.com/office/powerpoint/2010/main" val="2148005894"/>
+        <p14:creationId xmlns:p14="http://schemas.microsoft.com/office/powerpoint/2010/main" val="3932882741"/>
       </p:ext>
     </p:extLst>
   </p:cSld>
@@ -4794,22 +5744,12 @@
         </p:nvSpPr>
         <p:spPr/>
         <p:txBody>
-          <a:bodyPr>
-            <a:normAutofit/>
-          </a:bodyPr>
+          <a:bodyPr/>
           <a:lstStyle/>
           <a:p>
             <a:r>
               <a:rPr lang="en-US" dirty="0" smtClean="0"/>
-              <a:t>Hai! I’m F#! And dis </a:t>
-            </a:r>
-            <a:r>
-              <a:rPr lang="en-US" dirty="0" err="1" smtClean="0"/>
-              <a:t>mai</a:t>
-            </a:r>
-            <a:r>
-              <a:rPr lang="en-US" dirty="0" smtClean="0"/>
-              <a:t> friend REPL…</a:t>
+              <a:t>How to Get it Installed?</a:t>
             </a:r>
             <a:endParaRPr lang="en-US" dirty="0"/>
           </a:p>
@@ -4828,161 +5768,124 @@
         <p:spPr/>
         <p:txBody>
           <a:bodyPr>
-            <a:normAutofit fontScale="85000" lnSpcReduction="20000"/>
+            <a:normAutofit fontScale="77500" lnSpcReduction="20000"/>
           </a:bodyPr>
           <a:lstStyle/>
           <a:p>
             <a:r>
               <a:rPr lang="en-US" dirty="0" smtClean="0"/>
-              <a:t>Language Intro: </a:t>
-            </a:r>
-          </a:p>
-          <a:p>
-            <a:pPr lvl="1"/>
-            <a:r>
-              <a:rPr lang="en-US" dirty="0" smtClean="0"/>
-              <a:t>Start Here: </a:t>
+              <a:t>Can Develop using VS2015 Community Edition or higher</a:t>
+            </a:r>
+          </a:p>
+          <a:p>
+            <a:pPr lvl="1"/>
+            <a:r>
+              <a:rPr lang="en-US" dirty="0" smtClean="0"/>
+              <a:t>Must install F# 3.1.2 standalone package</a:t>
+            </a:r>
+          </a:p>
+          <a:p>
+            <a:pPr lvl="2"/>
+            <a:r>
+              <a:rPr lang="en-US" dirty="0">
+                <a:hlinkClick r:id="rId2"/>
+              </a:rPr>
+              <a:t>http://</a:t>
             </a:r>
             <a:r>
               <a:rPr lang="en-US" dirty="0" smtClean="0">
                 <a:hlinkClick r:id="rId2"/>
               </a:rPr>
-              <a:t>http</a:t>
-            </a:r>
-            <a:r>
-              <a:rPr lang="en-US" dirty="0">
-                <a:hlinkClick r:id="rId2"/>
-              </a:rPr>
-              <a:t>://fsharp.org/about/learning.html</a:t>
-            </a:r>
-            <a:endParaRPr lang="en-US" dirty="0"/>
-          </a:p>
-          <a:p>
-            <a:pPr lvl="1"/>
-            <a:r>
-              <a:rPr lang="en-US" dirty="0" smtClean="0"/>
-              <a:t>Syntax Guide: </a:t>
-            </a:r>
-            <a:r>
-              <a:rPr lang="en-US" dirty="0" smtClean="0">
-                <a:hlinkClick r:id="rId3"/>
-              </a:rPr>
-              <a:t>http</a:t>
-            </a:r>
-            <a:r>
-              <a:rPr lang="en-US" dirty="0">
-                <a:hlinkClick r:id="rId3"/>
-              </a:rPr>
-              <a:t>://dungpa.github.io/fsharp-cheatsheet/</a:t>
-            </a:r>
-            <a:endParaRPr lang="en-US" dirty="0"/>
-          </a:p>
-          <a:p>
-            <a:pPr lvl="1"/>
-            <a:r>
-              <a:rPr lang="en-US" dirty="0" smtClean="0"/>
-              <a:t>Why? Here’s Why!: </a:t>
-            </a:r>
-            <a:r>
-              <a:rPr lang="en-US" dirty="0" smtClean="0">
-                <a:hlinkClick r:id="rId4"/>
-              </a:rPr>
-              <a:t>http</a:t>
-            </a:r>
-            <a:r>
-              <a:rPr lang="en-US" dirty="0">
-                <a:hlinkClick r:id="rId4"/>
-              </a:rPr>
-              <a:t>://fsharpforfunandprofit.com/why-use-fsharp/</a:t>
-            </a:r>
-            <a:endParaRPr lang="en-US" dirty="0"/>
-          </a:p>
-          <a:p>
-            <a:pPr lvl="1"/>
-            <a:r>
-              <a:rPr lang="en-US" dirty="0" smtClean="0"/>
-              <a:t>My personal favorite intro session: </a:t>
-            </a:r>
-            <a:r>
-              <a:rPr lang="en-US" dirty="0" smtClean="0">
-                <a:hlinkClick r:id="rId5"/>
-              </a:rPr>
-              <a:t>https</a:t>
-            </a:r>
-            <a:r>
-              <a:rPr lang="en-US" dirty="0">
-                <a:hlinkClick r:id="rId5"/>
-              </a:rPr>
-              <a:t>://skillsmatter.com/skillscasts/4971-domain-driven-design-with-scott-wlaschin</a:t>
-            </a:r>
-            <a:endParaRPr lang="en-US" dirty="0"/>
-          </a:p>
-          <a:p>
-            <a:pPr lvl="1"/>
+              <a:t>www.microsoft.com/en-us/download/details.aspx?id=44011</a:t>
+            </a:r>
+            <a:endParaRPr lang="en-US" dirty="0" smtClean="0"/>
+          </a:p>
+          <a:p>
+            <a:pPr lvl="1"/>
+            <a:r>
+              <a:rPr lang="en-US" dirty="0" smtClean="0"/>
+              <a:t>VS2015 Now Fully supports F# PCL </a:t>
+            </a:r>
             <a:r>
               <a:rPr lang="en-US" dirty="0" err="1" smtClean="0"/>
-              <a:t>FSharpForFunAndProfit</a:t>
-            </a:r>
-            <a:r>
-              <a:rPr lang="en-US" dirty="0" smtClean="0"/>
-              <a:t>: </a:t>
-            </a:r>
-            <a:r>
-              <a:rPr lang="en-US" dirty="0" smtClean="0">
-                <a:hlinkClick r:id="rId6"/>
-              </a:rPr>
-              <a:t>http</a:t>
-            </a:r>
-            <a:r>
-              <a:rPr lang="en-US" dirty="0">
-                <a:hlinkClick r:id="rId6"/>
-              </a:rPr>
-              <a:t>://fsharpforfunandprofit.com/site-contents/</a:t>
-            </a:r>
-            <a:endParaRPr lang="en-US" dirty="0"/>
-          </a:p>
-          <a:p>
-            <a:pPr lvl="1"/>
-            <a:r>
-              <a:rPr lang="en-US" dirty="0" smtClean="0"/>
-              <a:t>More Why!: </a:t>
-            </a:r>
-            <a:r>
-              <a:rPr lang="en-US" dirty="0" smtClean="0">
-                <a:hlinkClick r:id="rId7"/>
-              </a:rPr>
-              <a:t>http</a:t>
-            </a:r>
-            <a:r>
-              <a:rPr lang="en-US" dirty="0">
-                <a:hlinkClick r:id="rId7"/>
-              </a:rPr>
-              <a:t>://fsharpforfunandprofit.com/series/why-use-fsharp.html</a:t>
-            </a:r>
-            <a:endParaRPr lang="en-US" dirty="0"/>
-          </a:p>
-          <a:p>
-            <a:r>
-              <a:rPr lang="en-US" dirty="0" smtClean="0"/>
-              <a:t>Tooling Intro:</a:t>
-            </a:r>
-          </a:p>
-          <a:p>
-            <a:pPr lvl="1"/>
-            <a:r>
-              <a:rPr lang="en-US" dirty="0" smtClean="0"/>
-              <a:t>F# Interactive (REPL)</a:t>
-            </a:r>
-          </a:p>
-          <a:p>
-            <a:pPr lvl="1"/>
-            <a:r>
-              <a:rPr lang="en-US" dirty="0" smtClean="0"/>
-              <a:t>VS Debugging works just like it does in C#</a:t>
-            </a:r>
-          </a:p>
-          <a:p>
-            <a:pPr lvl="1"/>
+              <a:t>Creatation</a:t>
+            </a:r>
+            <a:r>
+              <a:rPr lang="en-US" dirty="0"/>
+              <a:t> </a:t>
+            </a:r>
+            <a:endParaRPr lang="en-US" dirty="0" smtClean="0"/>
+          </a:p>
+          <a:p>
+            <a:pPr lvl="1"/>
+            <a:r>
+              <a:rPr lang="en-US" dirty="0" smtClean="0"/>
+              <a:t>F# 4.0 Is NOW Supported by </a:t>
+            </a:r>
+            <a:r>
+              <a:rPr lang="en-US" dirty="0" err="1" smtClean="0"/>
+              <a:t>Xamarin</a:t>
+            </a:r>
+            <a:endParaRPr lang="en-US" dirty="0" smtClean="0"/>
+          </a:p>
+          <a:p>
+            <a:pPr lvl="2"/>
+            <a:r>
+              <a:rPr lang="en-US" dirty="0" smtClean="0"/>
+              <a:t>C# UI Projects do NOT yet support F# 4.0</a:t>
+            </a:r>
+          </a:p>
+          <a:p>
+            <a:r>
+              <a:rPr lang="en-US" strike="sngStrike" dirty="0" smtClean="0"/>
+              <a:t>The Catch!</a:t>
+            </a:r>
+          </a:p>
+          <a:p>
+            <a:pPr lvl="1"/>
+            <a:r>
+              <a:rPr lang="en-US" strike="sngStrike" dirty="0" smtClean="0"/>
+              <a:t>IF you want to create C# Android or iOS </a:t>
+            </a:r>
+            <a:r>
+              <a:rPr lang="en-US" strike="sngStrike" dirty="0" err="1" smtClean="0"/>
+              <a:t>Xamarin</a:t>
+            </a:r>
+            <a:r>
+              <a:rPr lang="en-US" strike="sngStrike" dirty="0" smtClean="0"/>
+              <a:t> Project and use an F# Library</a:t>
+            </a:r>
+          </a:p>
+          <a:p>
+            <a:pPr lvl="1"/>
+            <a:r>
+              <a:rPr lang="en-US" strike="sngStrike" dirty="0" smtClean="0"/>
+              <a:t>THEN you must install VS2013 Community Edition or higher</a:t>
+            </a:r>
+          </a:p>
+          <a:p>
+            <a:pPr lvl="2"/>
+            <a:r>
+              <a:rPr lang="en-US" strike="sngStrike" dirty="0" smtClean="0"/>
+              <a:t>This installs F# 3.1 for you. Just apply the F# update ready to go when after installing.</a:t>
+            </a:r>
+          </a:p>
+          <a:p>
+            <a:pPr lvl="1"/>
+            <a:r>
+              <a:rPr lang="en-US" strike="sngStrike" dirty="0" smtClean="0"/>
+              <a:t>The F# Library must be created using the Visual F# Portable Library (Legacy) template in VS2013</a:t>
+            </a:r>
+          </a:p>
+          <a:p>
+            <a:pPr lvl="2"/>
+            <a:r>
+              <a:rPr lang="en-US" strike="sngStrike" dirty="0" smtClean="0"/>
+              <a:t>Copy this library to any solution and you’re good to go! You can use VS2015 or VS2013 to edit the library after it has been created.</a:t>
+            </a:r>
+          </a:p>
+          <a:p>
+            <a:pPr lvl="2"/>
             <a:endParaRPr lang="en-US" dirty="0"/>
           </a:p>
         </p:txBody>
@@ -4990,7 +5893,7 @@
     </p:spTree>
     <p:extLst>
       <p:ext uri="{BB962C8B-B14F-4D97-AF65-F5344CB8AC3E}">
-        <p14:creationId xmlns:p14="http://schemas.microsoft.com/office/powerpoint/2010/main" val="3932882741"/>
+        <p14:creationId xmlns:p14="http://schemas.microsoft.com/office/powerpoint/2010/main" val="188446312"/>
       </p:ext>
     </p:extLst>
   </p:cSld>
@@ -5041,115 +5944,46 @@
           <a:p>
             <a:r>
               <a:rPr lang="en-US" dirty="0" smtClean="0"/>
-              <a:t>How to Get it Installed?</a:t>
+              <a:t>Create Android App with C# UI</a:t>
             </a:r>
             <a:endParaRPr lang="en-US" dirty="0"/>
           </a:p>
         </p:txBody>
       </p:sp>
-      <p:sp>
-        <p:nvSpPr>
-          <p:cNvPr id="3" name="Content Placeholder 2"/>
-          <p:cNvSpPr>
-            <a:spLocks noGrp="1"/>
-          </p:cNvSpPr>
-          <p:nvPr>
-            <p:ph idx="1"/>
-          </p:nvPr>
-        </p:nvSpPr>
-        <p:spPr/>
-        <p:txBody>
-          <a:bodyPr>
-            <a:normAutofit fontScale="85000" lnSpcReduction="10000"/>
-          </a:bodyPr>
-          <a:lstStyle/>
-          <a:p>
-            <a:r>
-              <a:rPr lang="en-US" dirty="0" smtClean="0"/>
-              <a:t>Can Develop using VS2015 Community Edition or higher</a:t>
-            </a:r>
-          </a:p>
-          <a:p>
-            <a:pPr lvl="1"/>
-            <a:r>
-              <a:rPr lang="en-US" dirty="0" smtClean="0"/>
-              <a:t>Must install F# 3.1.2 standalone package</a:t>
-            </a:r>
-          </a:p>
-          <a:p>
-            <a:pPr lvl="2"/>
-            <a:r>
-              <a:rPr lang="en-US" dirty="0">
-                <a:hlinkClick r:id="rId2"/>
-              </a:rPr>
-              <a:t>http://www.microsoft.com/en-us/download/details.aspx?id=44011</a:t>
-            </a:r>
-            <a:endParaRPr lang="en-US" dirty="0" smtClean="0"/>
-          </a:p>
-          <a:p>
-            <a:r>
-              <a:rPr lang="en-US" dirty="0" smtClean="0"/>
-              <a:t>The Catch!</a:t>
-            </a:r>
-          </a:p>
-          <a:p>
-            <a:pPr lvl="1"/>
-            <a:r>
-              <a:rPr lang="en-US" dirty="0" smtClean="0"/>
-              <a:t>IF you want to create C# Android or iOS Xamarin Project and use an F# Library</a:t>
-            </a:r>
-          </a:p>
-          <a:p>
-            <a:pPr lvl="1"/>
-            <a:r>
-              <a:rPr lang="en-US" dirty="0" smtClean="0"/>
-              <a:t>THEN you must install VS2013 Community Edition or higher</a:t>
-            </a:r>
-          </a:p>
-          <a:p>
-            <a:pPr lvl="2"/>
-            <a:r>
-              <a:rPr lang="en-US" dirty="0" smtClean="0"/>
-              <a:t>This installs F# 3.1 for you. Just apply the F# update ready to go when after installing.</a:t>
-            </a:r>
-          </a:p>
-          <a:p>
-            <a:pPr lvl="1"/>
-            <a:r>
-              <a:rPr lang="en-US" dirty="0" smtClean="0"/>
-              <a:t>The F# Library must be created using the Visual F# Portable Library (Legacy) template in VS2013</a:t>
-            </a:r>
-          </a:p>
-          <a:p>
-            <a:pPr lvl="2"/>
-            <a:r>
-              <a:rPr lang="en-US" dirty="0" smtClean="0"/>
-              <a:t>Copy this library to any solution and you’re good to go! You can use VS2015 or VS2013 to edit the library after it has been created.</a:t>
-            </a:r>
-          </a:p>
-          <a:p>
-            <a:pPr lvl="2"/>
-            <a:endParaRPr lang="en-US" dirty="0"/>
-          </a:p>
-        </p:txBody>
-      </p:sp>
+      <p:pic>
+        <p:nvPicPr>
+          <p:cNvPr id="3" name="Picture 2"/>
+          <p:cNvPicPr>
+            <a:picLocks noChangeAspect="1"/>
+          </p:cNvPicPr>
+          <p:nvPr/>
+        </p:nvPicPr>
+        <p:blipFill>
+          <a:blip r:embed="rId2"/>
+          <a:stretch>
+            <a:fillRect/>
+          </a:stretch>
+        </p:blipFill>
+        <p:spPr>
+          <a:xfrm>
+            <a:off x="2072097" y="1140903"/>
+            <a:ext cx="8047806" cy="5587330"/>
+          </a:xfrm>
+          <a:prstGeom prst="rect">
+            <a:avLst/>
+          </a:prstGeom>
+        </p:spPr>
+      </p:pic>
     </p:spTree>
     <p:extLst>
       <p:ext uri="{BB962C8B-B14F-4D97-AF65-F5344CB8AC3E}">
-        <p14:creationId xmlns:p14="http://schemas.microsoft.com/office/powerpoint/2010/main" val="188446312"/>
+        <p14:creationId xmlns:p14="http://schemas.microsoft.com/office/powerpoint/2010/main" val="1411996891"/>
       </p:ext>
     </p:extLst>
   </p:cSld>
   <p:clrMapOvr>
     <a:masterClrMapping/>
   </p:clrMapOvr>
-  <p:timing>
-    <p:tnLst>
-      <p:par>
-        <p:cTn id="1" dur="indefinite" restart="never" nodeType="tmRoot"/>
-      </p:par>
-    </p:tnLst>
-  </p:timing>
 </p:sld>
 </file>
 

</xml_diff>

<commit_message>
Getting ready for Code on the Beach
</commit_message>
<xml_diff>
--- a/FSharpXamarin_Slides.pptx
+++ b/FSharpXamarin_Slides.pptx
@@ -3350,13 +3350,8 @@
             <a:pPr lvl="1"/>
             <a:r>
               <a:rPr lang="en-US" dirty="0" smtClean="0"/>
-              <a:t>C# Windows </a:t>
-            </a:r>
-            <a:r>
-              <a:rPr lang="en-US" smtClean="0"/>
-              <a:t>8.1 Universal (UAP)</a:t>
-            </a:r>
-            <a:endParaRPr lang="en-US" dirty="0" smtClean="0"/>
+              <a:t>C# Windows 8.1 Universal (UAP)</a:t>
+            </a:r>
           </a:p>
           <a:p>
             <a:pPr lvl="2"/>
@@ -3382,7 +3377,7 @@
               <a:rPr lang="en-US" dirty="0" smtClean="0">
                 <a:sym typeface="Wingdings" panose="05000000000000000000" pitchFamily="2" charset="2"/>
               </a:rPr>
-              <a:t></a:t>
+              <a:t> …yet…</a:t>
             </a:r>
             <a:endParaRPr lang="en-US" dirty="0" smtClean="0"/>
           </a:p>
@@ -3510,7 +3505,19 @@
             <a:pPr lvl="2"/>
             <a:r>
               <a:rPr lang="en-US" dirty="0" smtClean="0"/>
-              <a:t>However as of April 22 work is IN PROGRESS!!!</a:t>
+              <a:t>However as of </a:t>
+            </a:r>
+            <a:r>
+              <a:rPr lang="en-US" dirty="0" smtClean="0"/>
+              <a:t>July 7 we know that it is a priority for Microsoft, but will not be </a:t>
+            </a:r>
+            <a:r>
+              <a:rPr lang="en-US" smtClean="0"/>
+              <a:t>available </a:t>
+            </a:r>
+            <a:r>
+              <a:rPr lang="en-US" smtClean="0"/>
+              <a:t>before 2017</a:t>
             </a:r>
             <a:endParaRPr lang="en-US" dirty="0"/>
           </a:p>
@@ -3828,7 +3835,6 @@
               <a:rPr lang="en-US" dirty="0" smtClean="0"/>
               <a:t>Practice, Practice, Practice: </a:t>
             </a:r>
-            <a:endParaRPr lang="en-US" dirty="0" smtClean="0"/>
           </a:p>
           <a:p>
             <a:pPr lvl="2"/>
@@ -4750,7 +4756,7 @@
             </a:pPr>
             <a:r>
               <a:rPr lang="en-US" dirty="0" smtClean="0"/>
-              <a:t>Mention: Nerds Like You Meetup</a:t>
+              <a:t>Mention: Code on the Beach</a:t>
             </a:r>
           </a:p>
           <a:p>
@@ -5575,6 +5581,26 @@
           <a:lstStyle/>
           <a:p>
             <a:r>
+              <a:rPr lang="en-US" dirty="0"/>
+              <a:t>Tooling Intro:</a:t>
+            </a:r>
+          </a:p>
+          <a:p>
+            <a:pPr lvl="1"/>
+            <a:r>
+              <a:rPr lang="en-US" dirty="0"/>
+              <a:t>F# Interactive (REPL)</a:t>
+            </a:r>
+          </a:p>
+          <a:p>
+            <a:pPr lvl="1"/>
+            <a:r>
+              <a:rPr lang="en-US" dirty="0"/>
+              <a:t>VS Debugging works just like it does in C#</a:t>
+            </a:r>
+          </a:p>
+          <a:p>
+            <a:r>
               <a:rPr lang="en-US" dirty="0" smtClean="0"/>
               <a:t>Language Intro: </a:t>
             </a:r>
@@ -5702,26 +5728,6 @@
               <a:t>://fsharpforfunandprofit.com/series/why-use-fsharp.html</a:t>
             </a:r>
             <a:endParaRPr lang="en-US" dirty="0"/>
-          </a:p>
-          <a:p>
-            <a:r>
-              <a:rPr lang="en-US" dirty="0" smtClean="0"/>
-              <a:t>Tooling Intro:</a:t>
-            </a:r>
-          </a:p>
-          <a:p>
-            <a:pPr lvl="1"/>
-            <a:r>
-              <a:rPr lang="en-US" dirty="0" smtClean="0"/>
-              <a:t>F# Interactive (REPL)</a:t>
-            </a:r>
-          </a:p>
-          <a:p>
-            <a:pPr lvl="1"/>
-            <a:r>
-              <a:rPr lang="en-US" dirty="0" smtClean="0"/>
-              <a:t>VS Debugging works just like it does in C#</a:t>
-            </a:r>
           </a:p>
           <a:p>
             <a:pPr lvl="1"/>
@@ -5802,7 +5808,7 @@
         <p:spPr/>
         <p:txBody>
           <a:bodyPr>
-            <a:normAutofit fontScale="77500" lnSpcReduction="20000"/>
+            <a:normAutofit fontScale="85000" lnSpcReduction="20000"/>
           </a:bodyPr>
           <a:lstStyle/>
           <a:p>
@@ -5838,39 +5844,27 @@
             <a:pPr lvl="1"/>
             <a:r>
               <a:rPr lang="en-US" dirty="0" smtClean="0"/>
-              <a:t>VS2015 Now Fully supports F# PCL </a:t>
-            </a:r>
-            <a:r>
-              <a:rPr lang="en-US" dirty="0" err="1" smtClean="0"/>
-              <a:t>Creatation</a:t>
+              <a:t>VS2015 Update 2+ now </a:t>
             </a:r>
             <a:r>
               <a:rPr lang="en-US" dirty="0"/>
+              <a:t>f</a:t>
+            </a:r>
+            <a:r>
+              <a:rPr lang="en-US" dirty="0" smtClean="0"/>
+              <a:t>ully supports </a:t>
+            </a:r>
+            <a:r>
+              <a:rPr lang="en-US" dirty="0" smtClean="0"/>
+              <a:t>F# PCL </a:t>
+            </a:r>
+            <a:r>
+              <a:rPr lang="en-US" dirty="0" smtClean="0"/>
+              <a:t>creation</a:t>
+            </a:r>
+            <a:r>
+              <a:rPr lang="en-US" dirty="0" smtClean="0"/>
               <a:t> </a:t>
-            </a:r>
-            <a:endParaRPr lang="en-US" dirty="0" smtClean="0"/>
-          </a:p>
-          <a:p>
-            <a:pPr lvl="1"/>
-            <a:r>
-              <a:rPr lang="en-US" dirty="0" smtClean="0"/>
-              <a:t>F# 4.0 Is NOW Supported by </a:t>
-            </a:r>
-            <a:r>
-              <a:rPr lang="en-US" dirty="0" err="1" smtClean="0"/>
-              <a:t>Xamarin</a:t>
-            </a:r>
-            <a:endParaRPr lang="en-US" dirty="0" smtClean="0"/>
-          </a:p>
-          <a:p>
-            <a:pPr lvl="2"/>
-            <a:r>
-              <a:rPr lang="en-US" dirty="0" smtClean="0"/>
-              <a:t>C# UI Projects do NOT yet support F# </a:t>
-            </a:r>
-            <a:r>
-              <a:rPr lang="en-US" dirty="0" smtClean="0"/>
-              <a:t>4.0 (ONLY F# 3.0 &amp; 3.1)</a:t>
             </a:r>
             <a:endParaRPr lang="en-US" dirty="0" smtClean="0"/>
           </a:p>

</xml_diff>

<commit_message>
Preparing for presenting today!
</commit_message>
<xml_diff>
--- a/FSharpXamarin_Slides.pptx
+++ b/FSharpXamarin_Slides.pptx
@@ -3505,19 +3505,11 @@
             <a:pPr lvl="2"/>
             <a:r>
               <a:rPr lang="en-US" dirty="0" smtClean="0"/>
-              <a:t>However as of </a:t>
-            </a:r>
-            <a:r>
-              <a:rPr lang="en-US" dirty="0" smtClean="0"/>
-              <a:t>July 7 we know that it is a priority for Microsoft, but will not be </a:t>
+              <a:t>However as of July 7 we know that it is a priority for Microsoft, but will not be </a:t>
             </a:r>
             <a:r>
               <a:rPr lang="en-US" smtClean="0"/>
-              <a:t>available </a:t>
-            </a:r>
-            <a:r>
-              <a:rPr lang="en-US" smtClean="0"/>
-              <a:t>before 2017</a:t>
+              <a:t>available before 2017</a:t>
             </a:r>
             <a:endParaRPr lang="en-US" dirty="0"/>
           </a:p>
@@ -4233,7 +4225,12 @@
             <p:ph idx="1"/>
           </p:nvPr>
         </p:nvSpPr>
-        <p:spPr/>
+        <p:spPr>
+          <a:xfrm>
+            <a:off x="609600" y="1600201"/>
+            <a:ext cx="10972800" cy="4834155"/>
+          </a:xfrm>
+        </p:spPr>
         <p:txBody>
           <a:bodyPr>
             <a:normAutofit fontScale="77500" lnSpcReduction="20000"/>
@@ -4272,8 +4269,19 @@
           <a:p>
             <a:pPr lvl="2"/>
             <a:r>
+              <a:rPr lang="en-US" dirty="0" smtClean="0"/>
+              <a:t>HoloLens</a:t>
+            </a:r>
+          </a:p>
+          <a:p>
+            <a:pPr lvl="2"/>
+            <a:r>
+              <a:rPr lang="en-US" dirty="0" smtClean="0"/>
+              <a:t>Universal </a:t>
+            </a:r>
+            <a:r>
               <a:rPr lang="en-US" dirty="0"/>
-              <a:t>Universal Windows Platform </a:t>
+              <a:t>Windows Platform </a:t>
             </a:r>
             <a:r>
               <a:rPr lang="en-US" dirty="0" smtClean="0"/>
@@ -5852,21 +5860,8 @@
             </a:r>
             <a:r>
               <a:rPr lang="en-US" dirty="0" smtClean="0"/>
-              <a:t>ully supports </a:t>
-            </a:r>
-            <a:r>
-              <a:rPr lang="en-US" dirty="0" smtClean="0"/>
-              <a:t>F# PCL </a:t>
-            </a:r>
-            <a:r>
-              <a:rPr lang="en-US" dirty="0" smtClean="0"/>
-              <a:t>creation</a:t>
-            </a:r>
-            <a:r>
-              <a:rPr lang="en-US" dirty="0" smtClean="0"/>
-              <a:t> </a:t>
-            </a:r>
-            <a:endParaRPr lang="en-US" dirty="0" smtClean="0"/>
+              <a:t>ully supports F# PCL creation </a:t>
+            </a:r>
           </a:p>
           <a:p>
             <a:r>

</xml_diff>